<commit_message>
Commit dated 21 Sept
--
</commit_message>
<xml_diff>
--- a/Educational Use/2.SY/1.Sem 1/4.DMS = Database Management Systems/Shared Files by Neha Mam/Unit 1-Introduction.pptx
+++ b/Educational Use/2.SY/1.Sem 1/4.DMS = Database Management Systems/Shared Files by Neha Mam/Unit 1-Introduction.pptx
@@ -142,6 +142,22 @@
       </a:defRPr>
     </a:lvl9pPr>
   </p:defaultTextStyle>
+  <p:extLst>
+    <p:ext uri="{EFAFB233-063F-42B5-8137-9DF3F51BA10A}">
+      <p15:sldGuideLst xmlns:p15="http://schemas.microsoft.com/office/powerpoint/2012/main">
+        <p15:guide id="1" orient="horz" pos="2160">
+          <p15:clr>
+            <a:srgbClr val="A4A3A4"/>
+          </p15:clr>
+        </p15:guide>
+        <p15:guide id="2" pos="2880">
+          <p15:clr>
+            <a:srgbClr val="A4A3A4"/>
+          </p15:clr>
+        </p15:guide>
+      </p15:sldGuideLst>
+    </p:ext>
+  </p:extLst>
 </p:presentation>
 </file>
 
@@ -227,7 +243,7 @@
           <a:p>
             <a:fld id="{D65EAE56-C837-4FCF-850C-D72DA3B291AE}" type="datetimeFigureOut">
               <a:rPr lang="en-US" smtClean="0"/>
-              <a:t>29/08/2022</a:t>
+              <a:t>9/7/2023</a:t>
             </a:fld>
             <a:endParaRPr lang="en-US"/>
           </a:p>
@@ -291,38 +307,37 @@
           <a:p>
             <a:pPr lvl="0"/>
             <a:r>
-              <a:rPr lang="en-US" smtClean="0"/>
+              <a:rPr lang="en-US"/>
               <a:t>Click to edit Master text styles</a:t>
             </a:r>
           </a:p>
           <a:p>
             <a:pPr lvl="1"/>
             <a:r>
-              <a:rPr lang="en-US" smtClean="0"/>
+              <a:rPr lang="en-US"/>
               <a:t>Second level</a:t>
             </a:r>
           </a:p>
           <a:p>
             <a:pPr lvl="2"/>
             <a:r>
-              <a:rPr lang="en-US" smtClean="0"/>
+              <a:rPr lang="en-US"/>
               <a:t>Third level</a:t>
             </a:r>
           </a:p>
           <a:p>
             <a:pPr lvl="3"/>
             <a:r>
-              <a:rPr lang="en-US" smtClean="0"/>
+              <a:rPr lang="en-US"/>
               <a:t>Fourth level</a:t>
             </a:r>
           </a:p>
           <a:p>
             <a:pPr lvl="4"/>
             <a:r>
-              <a:rPr lang="en-US" smtClean="0"/>
+              <a:rPr lang="en-US"/>
               <a:t>Fifth level</a:t>
             </a:r>
-            <a:endParaRPr lang="en-US"/>
           </a:p>
         </p:txBody>
       </p:sp>
@@ -557,7 +572,7 @@
               <a:defRPr/>
             </a:pPr>
             <a:r>
-              <a:rPr lang="en-US" sz="1200" b="1" kern="1200" dirty="0" smtClean="0">
+              <a:rPr lang="en-US" sz="1200" b="1" kern="1200" dirty="0">
                 <a:solidFill>
                   <a:schemeClr val="tx1"/>
                 </a:solidFill>
@@ -569,7 +584,7 @@
               <a:t>Data is a collection of facts, while information puts those facts into context</a:t>
             </a:r>
             <a:r>
-              <a:rPr lang="en-US" sz="1200" kern="1200" dirty="0" smtClean="0">
+              <a:rPr lang="en-US" sz="1200" kern="1200" dirty="0">
                 <a:solidFill>
                   <a:schemeClr val="tx1"/>
                 </a:solidFill>
@@ -599,7 +614,7 @@
               <a:tabLst/>
               <a:defRPr/>
             </a:pPr>
-            <a:endParaRPr lang="en-US" sz="1200" kern="1200" dirty="0" smtClean="0">
+            <a:endParaRPr lang="en-US" sz="1200" kern="1200" dirty="0">
               <a:solidFill>
                 <a:schemeClr val="tx1"/>
               </a:solidFill>
@@ -612,11 +627,11 @@
           <a:p>
             <a:pPr fontAlgn="ctr"/>
             <a:r>
-              <a:rPr lang="en-US" dirty="0" smtClean="0"/>
+              <a:rPr lang="en-US" dirty="0"/>
               <a:t>Data Ex: </a:t>
             </a:r>
             <a:r>
-              <a:rPr lang="en-US" dirty="0" smtClean="0">
+              <a:rPr lang="en-US" dirty="0">
                 <a:effectLst/>
               </a:rPr>
               <a:t>Each student's test score is one piece of data.</a:t>
@@ -625,7 +640,7 @@
           <a:p>
             <a:pPr fontAlgn="ctr"/>
             <a:r>
-              <a:rPr lang="en-US" dirty="0" smtClean="0">
+              <a:rPr lang="en-US" dirty="0">
                 <a:effectLst/>
               </a:rPr>
               <a:t>Information ex: The average score of a class or of the entire school is information that can be derived from the given data</a:t>
@@ -633,7 +648,7 @@
           </a:p>
           <a:p>
             <a:pPr fontAlgn="ctr"/>
-            <a:endParaRPr lang="en-US" dirty="0" smtClean="0">
+            <a:endParaRPr lang="en-US" dirty="0">
               <a:effectLst/>
             </a:endParaRPr>
           </a:p>
@@ -656,7 +671,7 @@
               <a:defRPr/>
             </a:pPr>
             <a:r>
-              <a:rPr lang="en-US" sz="1200" b="0" i="0" kern="1200" dirty="0" smtClean="0">
+              <a:rPr lang="en-US" sz="1200" b="0" i="0" kern="1200" dirty="0">
                 <a:solidFill>
                   <a:schemeClr val="tx1"/>
                 </a:solidFill>
@@ -670,13 +685,13 @@
           </a:p>
           <a:p>
             <a:pPr fontAlgn="ctr"/>
-            <a:endParaRPr lang="en-US" dirty="0" smtClean="0">
+            <a:endParaRPr lang="en-US" dirty="0">
               <a:effectLst/>
             </a:endParaRPr>
           </a:p>
           <a:p>
             <a:r>
-              <a:rPr lang="en-US" sz="1200" kern="1200" dirty="0" smtClean="0">
+              <a:rPr lang="en-US" sz="1200" kern="1200" dirty="0">
                 <a:solidFill>
                   <a:schemeClr val="tx1"/>
                 </a:solidFill>
@@ -688,7 +703,7 @@
               <a:t>In computing, data is </a:t>
             </a:r>
             <a:r>
-              <a:rPr lang="en-US" sz="1200" b="1" kern="1200" dirty="0" smtClean="0">
+              <a:rPr lang="en-US" sz="1200" b="1" kern="1200" dirty="0">
                 <a:solidFill>
                   <a:schemeClr val="tx1"/>
                 </a:solidFill>
@@ -700,7 +715,7 @@
               <a:t>information that has been translated into a form that is efficient for movement or processing</a:t>
             </a:r>
             <a:r>
-              <a:rPr lang="en-US" sz="1200" kern="1200" dirty="0" smtClean="0">
+              <a:rPr lang="en-US" sz="1200" kern="1200" dirty="0">
                 <a:solidFill>
                   <a:schemeClr val="tx1"/>
                 </a:solidFill>
@@ -714,7 +729,7 @@
           </a:p>
           <a:p>
             <a:r>
-              <a:rPr lang="en-US" sz="1200" b="1" kern="1200" dirty="0" smtClean="0">
+              <a:rPr lang="en-US" sz="1200" b="1" kern="1200" dirty="0">
                 <a:solidFill>
                   <a:schemeClr val="tx1"/>
                 </a:solidFill>
@@ -725,7 +740,7 @@
               </a:rPr>
               <a:t> </a:t>
             </a:r>
-            <a:endParaRPr lang="en-US" sz="1200" kern="1200" dirty="0" smtClean="0">
+            <a:endParaRPr lang="en-US" sz="1200" kern="1200" dirty="0">
               <a:solidFill>
                 <a:schemeClr val="tx1"/>
               </a:solidFill>
@@ -821,24 +836,24 @@
           <a:lstStyle/>
           <a:p>
             <a:r>
-              <a:rPr lang="en-US" b="1" dirty="0" smtClean="0"/>
+              <a:rPr lang="en-US" b="1" dirty="0"/>
               <a:t>Data abstraction</a:t>
             </a:r>
             <a:r>
-              <a:rPr lang="en-US" b="1" baseline="0" dirty="0" smtClean="0"/>
+              <a:rPr lang="en-US" b="1" baseline="0" dirty="0"/>
               <a:t> is used to achieve data independence means data and user should be act as 2 different entities</a:t>
             </a:r>
             <a:r>
-              <a:rPr lang="en-US" baseline="0" dirty="0" smtClean="0"/>
+              <a:rPr lang="en-US" baseline="0" dirty="0"/>
               <a:t>. As users are just interested in data contents and not in the actual complex structure about storage of the data so through the data abstraction we are hiding it</a:t>
             </a:r>
           </a:p>
           <a:p>
-            <a:endParaRPr lang="en-US" baseline="0" dirty="0" smtClean="0"/>
-          </a:p>
-          <a:p>
-            <a:r>
-              <a:rPr lang="en-US" sz="2000" b="1" baseline="0" dirty="0" err="1" smtClean="0"/>
+            <a:endParaRPr lang="en-US" baseline="0" dirty="0"/>
+          </a:p>
+          <a:p>
+            <a:r>
+              <a:rPr lang="en-US" sz="2000" b="1" baseline="0" dirty="0" err="1"/>
               <a:t>Example:Gmail</a:t>
             </a:r>
             <a:endParaRPr lang="en-US" sz="2000" b="1" dirty="0"/>
@@ -926,7 +941,7 @@
           <a:lstStyle/>
           <a:p>
             <a:r>
-              <a:rPr lang="en-US" b="1" dirty="0" smtClean="0">
+              <a:rPr lang="en-US" b="1" dirty="0">
                 <a:solidFill>
                   <a:srgbClr val="FF0000"/>
                 </a:solidFill>
@@ -934,45 +949,45 @@
               <a:t>View level- </a:t>
             </a:r>
             <a:r>
-              <a:rPr lang="en-US" dirty="0" smtClean="0"/>
+              <a:rPr lang="en-US" dirty="0"/>
               <a:t>it means how the data should</a:t>
             </a:r>
             <a:r>
-              <a:rPr lang="en-US" baseline="0" dirty="0" smtClean="0"/>
+              <a:rPr lang="en-US" baseline="0" dirty="0"/>
               <a:t> be visible to the user or the way in which you present the data to the user. </a:t>
             </a:r>
             <a:r>
-              <a:rPr lang="en-US" b="1" baseline="0" dirty="0" smtClean="0"/>
+              <a:rPr lang="en-US" b="1" baseline="0" dirty="0"/>
               <a:t>Ex: University  database users and their views.</a:t>
             </a:r>
           </a:p>
           <a:p>
-            <a:endParaRPr lang="en-US" b="1" dirty="0" smtClean="0"/>
-          </a:p>
-          <a:p>
-            <a:r>
-              <a:rPr lang="en-US" b="1" dirty="0" smtClean="0"/>
+            <a:endParaRPr lang="en-US" b="1" dirty="0"/>
+          </a:p>
+          <a:p>
+            <a:r>
+              <a:rPr lang="en-US" b="1" dirty="0"/>
               <a:t>Conceptual Level-</a:t>
             </a:r>
             <a:r>
-              <a:rPr lang="en-US" b="1" baseline="0" dirty="0" smtClean="0"/>
+              <a:rPr lang="en-US" b="1" baseline="0" dirty="0"/>
               <a:t> </a:t>
             </a:r>
             <a:r>
-              <a:rPr lang="en-US" b="0" baseline="0" dirty="0" smtClean="0"/>
+              <a:rPr lang="en-US" b="0" baseline="0" dirty="0"/>
               <a:t>It determines what data need to be stored and what are different relationships exists between data.</a:t>
             </a:r>
           </a:p>
           <a:p>
-            <a:endParaRPr lang="en-US" b="0" baseline="0" dirty="0" smtClean="0"/>
-          </a:p>
-          <a:p>
-            <a:r>
-              <a:rPr lang="en-US" b="1" baseline="0" dirty="0" smtClean="0"/>
+            <a:endParaRPr lang="en-US" b="0" baseline="0" dirty="0"/>
+          </a:p>
+          <a:p>
+            <a:r>
+              <a:rPr lang="en-US" b="1" baseline="0" dirty="0"/>
               <a:t>Physical level- </a:t>
             </a:r>
             <a:r>
-              <a:rPr lang="en-US" b="0" baseline="0" dirty="0" smtClean="0"/>
+              <a:rPr lang="en-US" b="0" baseline="0" dirty="0"/>
               <a:t>here it includes design specifications of stored database contents like physical storage structure, indexes, locations etc</a:t>
             </a:r>
             <a:endParaRPr lang="en-US" b="0" dirty="0"/>
@@ -1060,7 +1075,7 @@
           <a:lstStyle/>
           <a:p>
             <a:r>
-              <a:rPr lang="en-US" sz="1200" b="1" i="0" u="none" strike="noStrike" kern="1200" baseline="0" dirty="0" smtClean="0">
+              <a:rPr lang="en-US" sz="1200" b="1" i="0" u="none" strike="noStrike" kern="1200" baseline="0" dirty="0">
                 <a:solidFill>
                   <a:schemeClr val="tx1"/>
                 </a:solidFill>
@@ -1071,7 +1086,7 @@
               <a:t>physical design </a:t>
             </a:r>
             <a:r>
-              <a:rPr lang="en-US" sz="1200" b="0" i="0" u="none" strike="noStrike" kern="1200" baseline="0" dirty="0" smtClean="0">
+              <a:rPr lang="en-US" sz="1200" b="0" i="0" u="none" strike="noStrike" kern="1200" baseline="0" dirty="0">
                 <a:solidFill>
                   <a:schemeClr val="tx1"/>
                 </a:solidFill>
@@ -1082,7 +1097,7 @@
               <a:t>phase, during which the internal storage structures, access paths, and file organizations for the database files are specified. </a:t>
             </a:r>
             <a:r>
-              <a:rPr lang="en-US" sz="1200" b="0" i="0" u="none" strike="noStrike" kern="1200" baseline="0" smtClean="0">
+              <a:rPr lang="en-US" sz="1200" b="0" i="0" u="none" strike="noStrike" kern="1200" baseline="0">
                 <a:solidFill>
                   <a:schemeClr val="tx1"/>
                 </a:solidFill>
@@ -1177,14 +1192,13 @@
           <a:lstStyle/>
           <a:p>
             <a:r>
-              <a:rPr lang="en-US" dirty="0" err="1" smtClean="0"/>
+              <a:rPr lang="en-US" dirty="0" err="1"/>
               <a:t>Korth</a:t>
             </a:r>
             <a:r>
-              <a:rPr lang="en-US" dirty="0" smtClean="0"/>
+              <a:rPr lang="en-US" dirty="0"/>
               <a:t> – page no 685</a:t>
             </a:r>
-            <a:endParaRPr lang="en-US" dirty="0"/>
           </a:p>
         </p:txBody>
       </p:sp>
@@ -1357,7 +1371,7 @@
               <a:buChar char="•"/>
             </a:pPr>
             <a:r>
-              <a:rPr lang="en-US" sz="1200" b="0" i="0" kern="1200" dirty="0" smtClean="0">
+              <a:rPr lang="en-US" sz="1200" b="0" i="0" kern="1200" dirty="0">
                 <a:solidFill>
                   <a:schemeClr val="tx1"/>
                 </a:solidFill>
@@ -1369,7 +1383,7 @@
               <a:t>An application program interface (API) is </a:t>
             </a:r>
             <a:r>
-              <a:rPr lang="en-US" sz="1200" b="1" i="0" kern="1200" dirty="0" smtClean="0">
+              <a:rPr lang="en-US" sz="1200" b="1" i="0" kern="1200" dirty="0">
                 <a:solidFill>
                   <a:schemeClr val="tx1"/>
                 </a:solidFill>
@@ -1381,7 +1395,7 @@
               <a:t>code that allows two software programs to communicate with each other</a:t>
             </a:r>
             <a:r>
-              <a:rPr lang="en-US" sz="1200" b="0" i="0" kern="1200" dirty="0" smtClean="0">
+              <a:rPr lang="en-US" sz="1200" b="0" i="0" kern="1200" dirty="0">
                 <a:solidFill>
                   <a:schemeClr val="tx1"/>
                 </a:solidFill>
@@ -1399,19 +1413,19 @@
               <a:buChar char="•"/>
             </a:pPr>
             <a:r>
-              <a:rPr lang="en-US" b="1" dirty="0" err="1" smtClean="0">
+              <a:rPr lang="en-US" b="1" dirty="0" err="1">
                 <a:effectLst/>
               </a:rPr>
               <a:t>PaaS</a:t>
             </a:r>
             <a:r>
-              <a:rPr lang="en-US" dirty="0" smtClean="0">
+              <a:rPr lang="en-US" dirty="0">
                 <a:effectLst/>
               </a:rPr>
               <a:t>  </a:t>
             </a:r>
             <a:r>
-              <a:rPr lang="en-US" sz="1200" b="0" i="0" kern="1200" dirty="0" smtClean="0">
+              <a:rPr lang="en-US" sz="1200" b="0" i="0" kern="1200" dirty="0">
                 <a:solidFill>
                   <a:schemeClr val="tx1"/>
                 </a:solidFill>
@@ -1423,42 +1437,42 @@
               <a:t>The platform as a service computing model gives organizations the power to develop software without needing to maintain the backend environment. </a:t>
             </a:r>
             <a:r>
-              <a:rPr lang="en-US" dirty="0" smtClean="0">
+              <a:rPr lang="en-US" dirty="0">
                 <a:effectLst/>
               </a:rPr>
               <a:t>AWS Elastic Beanstalk, Windows Azure, </a:t>
             </a:r>
             <a:r>
-              <a:rPr lang="en-US" dirty="0" err="1" smtClean="0">
+              <a:rPr lang="en-US" dirty="0" err="1">
                 <a:effectLst/>
               </a:rPr>
               <a:t>Heroku</a:t>
             </a:r>
             <a:r>
-              <a:rPr lang="en-US" dirty="0" smtClean="0">
+              <a:rPr lang="en-US" dirty="0">
                 <a:effectLst/>
               </a:rPr>
               <a:t>, Force.com, Google App Engine, Apache </a:t>
             </a:r>
             <a:r>
-              <a:rPr lang="en-US" dirty="0" err="1" smtClean="0">
+              <a:rPr lang="en-US" dirty="0" err="1">
                 <a:effectLst/>
               </a:rPr>
               <a:t>Stratos</a:t>
             </a:r>
             <a:r>
-              <a:rPr lang="en-US" dirty="0" smtClean="0">
+              <a:rPr lang="en-US" dirty="0">
                 <a:effectLst/>
               </a:rPr>
               <a:t>, </a:t>
             </a:r>
             <a:r>
-              <a:rPr lang="en-US" dirty="0" err="1" smtClean="0">
+              <a:rPr lang="en-US" dirty="0" err="1">
                 <a:effectLst/>
               </a:rPr>
               <a:t>OpenShift</a:t>
             </a:r>
-            <a:endParaRPr lang="en-US" dirty="0" smtClean="0">
+            <a:endParaRPr lang="en-US" dirty="0">
               <a:effectLst/>
             </a:endParaRPr>
           </a:p>
@@ -1468,68 +1482,64 @@
               <a:buChar char="•"/>
             </a:pPr>
             <a:r>
-              <a:rPr lang="en-US" b="1" dirty="0" err="1" smtClean="0">
+              <a:rPr lang="en-US" b="1" dirty="0" err="1">
                 <a:effectLst/>
               </a:rPr>
               <a:t>IaaS</a:t>
             </a:r>
             <a:r>
-              <a:rPr lang="en-US" dirty="0" smtClean="0">
+              <a:rPr lang="en-US" dirty="0">
                 <a:effectLst/>
               </a:rPr>
               <a:t> </a:t>
             </a:r>
             <a:r>
-              <a:rPr lang="en-US" dirty="0" err="1" smtClean="0">
+              <a:rPr lang="en-US" dirty="0" err="1">
                 <a:effectLst/>
               </a:rPr>
               <a:t>DigitalOcean</a:t>
             </a:r>
             <a:r>
-              <a:rPr lang="en-US" dirty="0" smtClean="0">
+              <a:rPr lang="en-US" dirty="0">
                 <a:effectLst/>
               </a:rPr>
               <a:t>, </a:t>
             </a:r>
             <a:r>
-              <a:rPr lang="en-US" dirty="0" err="1" smtClean="0">
+              <a:rPr lang="en-US" dirty="0" err="1">
                 <a:effectLst/>
               </a:rPr>
               <a:t>Linode</a:t>
             </a:r>
             <a:r>
-              <a:rPr lang="en-US" dirty="0" smtClean="0">
+              <a:rPr lang="en-US" dirty="0">
                 <a:effectLst/>
               </a:rPr>
               <a:t>, Rackspace, Amazon Web Services (AWS), Cisco </a:t>
             </a:r>
             <a:r>
-              <a:rPr lang="en-US" dirty="0" err="1" smtClean="0">
+              <a:rPr lang="en-US" dirty="0" err="1">
                 <a:effectLst/>
               </a:rPr>
               <a:t>Metapod</a:t>
             </a:r>
             <a:r>
-              <a:rPr lang="en-US" dirty="0" smtClean="0">
+              <a:rPr lang="en-US" dirty="0">
                 <a:effectLst/>
               </a:rPr>
               <a:t>, Microsoft Azure, Google Compute Engine (GCE)</a:t>
             </a:r>
-            <a:r>
-              <a:rPr lang="en-US" dirty="0" smtClean="0"/>
-              <a:t/>
-            </a:r>
             <a:br>
-              <a:rPr lang="en-US" dirty="0" smtClean="0"/>
+              <a:rPr lang="en-US" dirty="0"/>
             </a:br>
-            <a:endParaRPr lang="en-US" dirty="0" smtClean="0"/>
+            <a:endParaRPr lang="en-US" dirty="0"/>
           </a:p>
           <a:p>
             <a:pPr marL="171450" indent="-171450">
               <a:buFont typeface="Arial" pitchFamily="34" charset="0"/>
               <a:buChar char="•"/>
             </a:pPr>
-            <a:endParaRPr lang="en-US" dirty="0" smtClean="0"/>
+            <a:endParaRPr lang="en-US" dirty="0"/>
           </a:p>
           <a:p>
             <a:pPr marL="171450" indent="-171450">
@@ -1537,11 +1547,11 @@
               <a:buChar char="•"/>
             </a:pPr>
             <a:r>
-              <a:rPr lang="en-US" dirty="0" smtClean="0"/>
+              <a:rPr lang="en-US" dirty="0"/>
               <a:t>In 2 tier  limited clients are there so maintenance</a:t>
             </a:r>
             <a:r>
-              <a:rPr lang="en-US" baseline="0" dirty="0" smtClean="0"/>
+              <a:rPr lang="en-US" baseline="0" dirty="0"/>
               <a:t> is easy but scalability it can’t provide as it can not be made available 24*7 for all clients.</a:t>
             </a:r>
           </a:p>
@@ -1550,14 +1560,13 @@
               <a:buFont typeface="Arial" pitchFamily="34" charset="0"/>
               <a:buChar char="•"/>
             </a:pPr>
-            <a:endParaRPr lang="en-US" dirty="0" smtClean="0"/>
-          </a:p>
-          <a:p>
-            <a:r>
-              <a:rPr lang="en-US" dirty="0" smtClean="0"/>
+            <a:endParaRPr lang="en-US" dirty="0"/>
+          </a:p>
+          <a:p>
+            <a:r>
+              <a:rPr lang="en-US" dirty="0"/>
               <a:t>A standard called Open Database Connectivity (ODBC) provides an application programming interface (API), which allows client-side programs to call the DBMS, as long as both client and server machines have the necessary software installed. Most DBMS vendors provide ODBC drivers for their systems. A client program can actually connect to several RDBMSs and send query and transaction requests using the ODBC API, which are then processed at the server sites. Any query results are sent back to the client program, which can process and display the results as needed. A related standard for the Java programming language, called JDBC, has also been defined. This allows Java client programs to access one or more DBMSs through a standard interface</a:t>
             </a:r>
-            <a:endParaRPr lang="en-US" dirty="0"/>
           </a:p>
         </p:txBody>
       </p:sp>
@@ -1659,7 +1668,7 @@
               <a:defRPr/>
             </a:pPr>
             <a:r>
-              <a:rPr lang="en-US" sz="1200" b="0" i="0" kern="1200" dirty="0" smtClean="0">
+              <a:rPr lang="en-US" sz="1200" b="0" i="0" kern="1200" dirty="0">
                 <a:solidFill>
                   <a:schemeClr val="tx1"/>
                 </a:solidFill>
@@ -1671,7 +1680,7 @@
               <a:t>An application server is </a:t>
             </a:r>
             <a:r>
-              <a:rPr lang="en-US" sz="1200" b="1" i="0" kern="1200" dirty="0" smtClean="0">
+              <a:rPr lang="en-US" sz="1200" b="1" i="0" kern="1200" dirty="0">
                 <a:solidFill>
                   <a:schemeClr val="tx1"/>
                 </a:solidFill>
@@ -1682,7 +1691,7 @@
               </a:rPr>
               <a:t>a modern form of platform middleware.</a:t>
             </a:r>
-            <a:endParaRPr lang="en-US" sz="1200" b="0" i="0" kern="1200" dirty="0" smtClean="0">
+            <a:endParaRPr lang="en-US" sz="1200" b="0" i="0" kern="1200" dirty="0">
               <a:solidFill>
                 <a:schemeClr val="tx1"/>
               </a:solidFill>
@@ -1711,7 +1720,7 @@
               <a:defRPr/>
             </a:pPr>
             <a:r>
-              <a:rPr lang="en-US" sz="1200" b="0" i="0" kern="1200" dirty="0" smtClean="0">
+              <a:rPr lang="en-US" sz="1200" b="0" i="0" kern="1200" dirty="0">
                 <a:solidFill>
                   <a:schemeClr val="tx1"/>
                 </a:solidFill>
@@ -1723,7 +1732,7 @@
               <a:t>Examples of application server : </a:t>
             </a:r>
             <a:r>
-              <a:rPr lang="en-US" sz="1200" b="0" i="0" kern="1200" dirty="0" err="1" smtClean="0">
+              <a:rPr lang="en-US" sz="1200" b="0" i="0" kern="1200" dirty="0" err="1">
                 <a:solidFill>
                   <a:schemeClr val="tx1"/>
                 </a:solidFill>
@@ -1735,7 +1744,7 @@
               <a:t>JBoss</a:t>
             </a:r>
             <a:r>
-              <a:rPr lang="en-US" sz="1200" b="0" i="0" kern="1200" dirty="0" smtClean="0">
+              <a:rPr lang="en-US" sz="1200" b="0" i="0" kern="1200" dirty="0">
                 <a:solidFill>
                   <a:schemeClr val="tx1"/>
                 </a:solidFill>
@@ -1747,7 +1756,7 @@
               <a:t>: Open-source server from </a:t>
             </a:r>
             <a:r>
-              <a:rPr lang="en-US" sz="1200" b="0" i="0" kern="1200" dirty="0" err="1" smtClean="0">
+              <a:rPr lang="en-US" sz="1200" b="0" i="0" kern="1200" dirty="0" err="1">
                 <a:solidFill>
                   <a:schemeClr val="tx1"/>
                 </a:solidFill>
@@ -1759,7 +1768,7 @@
               <a:t>JBoss</a:t>
             </a:r>
             <a:r>
-              <a:rPr lang="en-US" sz="1200" b="0" i="0" kern="1200" dirty="0" smtClean="0">
+              <a:rPr lang="en-US" sz="1200" b="0" i="0" kern="1200" dirty="0">
                 <a:solidFill>
                   <a:schemeClr val="tx1"/>
                 </a:solidFill>
@@ -1770,7 +1779,7 @@
               </a:rPr>
               <a:t> community. Glassfish: Provided by Sun Microsystem.</a:t>
             </a:r>
-            <a:endParaRPr lang="en-US" sz="1200" b="1" dirty="0" smtClean="0"/>
+            <a:endParaRPr lang="en-US" sz="1200" b="1" dirty="0"/>
           </a:p>
           <a:p>
             <a:pPr marL="0" marR="0" indent="0" algn="l" defTabSz="914400" rtl="0" eaLnBrk="1" fontAlgn="auto" latinLnBrk="0" hangingPunct="1">
@@ -1791,18 +1800,18 @@
               <a:defRPr/>
             </a:pPr>
             <a:r>
-              <a:rPr lang="en-US" sz="1200" b="1" dirty="0" smtClean="0"/>
+              <a:rPr lang="en-US" sz="1200" b="1" dirty="0"/>
               <a:t>Disadvantages</a:t>
             </a:r>
             <a:r>
-              <a:rPr lang="en-US" sz="1200" dirty="0" smtClean="0"/>
+              <a:rPr lang="en-US" sz="1200" dirty="0"/>
               <a:t>: </a:t>
             </a:r>
             <a:br>
-              <a:rPr lang="en-US" sz="1200" dirty="0" smtClean="0"/>
+              <a:rPr lang="en-US" sz="1200" dirty="0"/>
             </a:br>
             <a:r>
-              <a:rPr lang="en-US" sz="1200" dirty="0" smtClean="0"/>
+              <a:rPr lang="en-US" sz="1200" dirty="0"/>
               <a:t>Increased complexity of implementation and communication. It becomes difficult for this sort of interaction to take place due to the presence of middle layers. </a:t>
             </a:r>
           </a:p>
@@ -1976,7 +1985,7 @@
           <a:lstStyle/>
           <a:p>
             <a:r>
-              <a:rPr lang="en-US" sz="1200" b="1" i="0" u="none" strike="noStrike" kern="1200" baseline="0" dirty="0" smtClean="0">
+              <a:rPr lang="en-US" sz="1200" b="1" i="0" u="none" strike="noStrike" kern="1200" baseline="0" dirty="0">
                 <a:solidFill>
                   <a:schemeClr val="tx1"/>
                 </a:solidFill>
@@ -1989,7 +1998,7 @@
           </a:p>
           <a:p>
             <a:r>
-              <a:rPr lang="en-US" sz="1200" b="1" i="0" u="none" strike="noStrike" kern="1200" baseline="0" dirty="0" smtClean="0">
+              <a:rPr lang="en-US" sz="1200" b="1" i="0" u="none" strike="noStrike" kern="1200" baseline="0" dirty="0">
                 <a:solidFill>
                   <a:schemeClr val="tx1"/>
                 </a:solidFill>
@@ -2002,7 +2011,7 @@
           </a:p>
           <a:p>
             <a:r>
-              <a:rPr lang="en-US" sz="1200" b="1" i="0" u="none" strike="noStrike" kern="1200" baseline="0" dirty="0" smtClean="0">
+              <a:rPr lang="en-US" sz="1200" b="1" i="0" u="none" strike="noStrike" kern="1200" baseline="0" dirty="0">
                 <a:solidFill>
                   <a:schemeClr val="tx1"/>
                 </a:solidFill>
@@ -2015,7 +2024,7 @@
           </a:p>
           <a:p>
             <a:r>
-              <a:rPr lang="en-US" sz="1200" b="1" i="0" u="none" strike="noStrike" kern="1200" baseline="0" dirty="0" smtClean="0">
+              <a:rPr lang="en-US" sz="1200" b="1" i="0" u="none" strike="noStrike" kern="1200" baseline="0" dirty="0">
                 <a:solidFill>
                   <a:schemeClr val="tx1"/>
                 </a:solidFill>
@@ -2026,7 +2035,7 @@
               <a:t>intensive. </a:t>
             </a:r>
             <a:r>
-              <a:rPr lang="en-US" sz="1200" b="0" i="0" u="none" strike="noStrike" kern="1200" baseline="0" dirty="0" smtClean="0">
+              <a:rPr lang="en-US" sz="1200" b="0" i="0" u="none" strike="noStrike" kern="1200" baseline="0" dirty="0">
                 <a:solidFill>
                   <a:schemeClr val="tx1"/>
                 </a:solidFill>
@@ -2039,7 +2048,7 @@
           </a:p>
           <a:p>
             <a:r>
-              <a:rPr lang="en-US" sz="1200" b="0" i="0" u="none" strike="noStrike" kern="1200" baseline="0" dirty="0" smtClean="0">
+              <a:rPr lang="en-US" sz="1200" b="0" i="0" u="none" strike="noStrike" kern="1200" baseline="0" dirty="0">
                 <a:solidFill>
                   <a:schemeClr val="tx1"/>
                 </a:solidFill>
@@ -2052,7 +2061,7 @@
           </a:p>
           <a:p>
             <a:r>
-              <a:rPr lang="en-US" sz="1200" b="0" i="0" u="none" strike="noStrike" kern="1200" baseline="0" dirty="0" smtClean="0">
+              <a:rPr lang="en-US" sz="1200" b="0" i="0" u="none" strike="noStrike" kern="1200" baseline="0" dirty="0">
                 <a:solidFill>
                   <a:schemeClr val="tx1"/>
                 </a:solidFill>
@@ -2063,7 +2072,7 @@
               <a:t>to ship the data back to the server machine. </a:t>
             </a:r>
             <a:r>
-              <a:rPr lang="en-US" sz="1200" b="1" i="0" u="none" strike="noStrike" kern="1200" baseline="0" dirty="0" smtClean="0">
+              <a:rPr lang="en-US" sz="1200" b="1" i="0" u="none" strike="noStrike" kern="1200" baseline="0" dirty="0">
                 <a:solidFill>
                   <a:schemeClr val="tx1"/>
                 </a:solidFill>
@@ -2076,7 +2085,7 @@
           </a:p>
           <a:p>
             <a:r>
-              <a:rPr lang="en-US" sz="1200" b="1" i="0" u="none" strike="noStrike" kern="1200" baseline="0" dirty="0" smtClean="0">
+              <a:rPr lang="en-US" sz="1200" b="1" i="0" u="none" strike="noStrike" kern="1200" baseline="0" dirty="0">
                 <a:solidFill>
                   <a:schemeClr val="tx1"/>
                 </a:solidFill>
@@ -2087,7 +2096,7 @@
               <a:t>back-end functionality at the clients</a:t>
             </a:r>
             <a:r>
-              <a:rPr lang="en-US" sz="1200" b="0" i="0" u="none" strike="noStrike" kern="1200" baseline="0" dirty="0" smtClean="0">
+              <a:rPr lang="en-US" sz="1200" b="0" i="0" u="none" strike="noStrike" kern="1200" baseline="0" dirty="0">
                 <a:solidFill>
                   <a:schemeClr val="tx1"/>
                 </a:solidFill>
@@ -2100,7 +2109,7 @@
           </a:p>
           <a:p>
             <a:r>
-              <a:rPr lang="en-US" sz="1200" b="0" i="0" u="none" strike="noStrike" kern="1200" baseline="0" dirty="0" smtClean="0">
+              <a:rPr lang="en-US" sz="1200" b="0" i="0" u="none" strike="noStrike" kern="1200" baseline="0" dirty="0">
                 <a:solidFill>
                   <a:schemeClr val="tx1"/>
                 </a:solidFill>
@@ -2195,13 +2204,13 @@
           <a:lstStyle/>
           <a:p>
             <a:r>
-              <a:rPr lang="en-US" dirty="0" smtClean="0"/>
+              <a:rPr lang="en-US" dirty="0"/>
               <a:t>Relational database example: MYSQL, Oracle etc</a:t>
             </a:r>
           </a:p>
           <a:p>
             <a:r>
-              <a:rPr lang="en-US" sz="1200" kern="1200" dirty="0" smtClean="0">
+              <a:rPr lang="en-US" sz="1200" kern="1200" dirty="0">
                 <a:solidFill>
                   <a:schemeClr val="tx1"/>
                 </a:solidFill>
@@ -2212,19 +2221,19 @@
               </a:rPr>
               <a:t>Object Oriented data model is a database management system in which information is represented in the form of objects as used in object-oriented programming.</a:t>
             </a:r>
-            <a:endParaRPr lang="en-US" dirty="0" smtClean="0"/>
-          </a:p>
-          <a:p>
-            <a:r>
-              <a:rPr lang="en-US" dirty="0" smtClean="0"/>
+            <a:endParaRPr lang="en-US" dirty="0"/>
+          </a:p>
+          <a:p>
+            <a:r>
+              <a:rPr lang="en-US" dirty="0"/>
               <a:t>Object oriented model examples: O2, </a:t>
             </a:r>
             <a:r>
-              <a:rPr lang="en-US" dirty="0" err="1" smtClean="0"/>
+              <a:rPr lang="en-US" dirty="0" err="1"/>
               <a:t>Jasmine,Object</a:t>
             </a:r>
             <a:r>
-              <a:rPr lang="en-US" dirty="0" smtClean="0"/>
+              <a:rPr lang="en-US" dirty="0"/>
               <a:t> store</a:t>
             </a:r>
           </a:p>
@@ -2234,7 +2243,7 @@
               <a:buChar char="•"/>
             </a:pPr>
             <a:r>
-              <a:rPr lang="en-US" sz="1200" b="1" i="1" kern="1200" dirty="0" smtClean="0">
+              <a:rPr lang="en-US" sz="1200" b="1" i="1" kern="1200" dirty="0">
                 <a:solidFill>
                   <a:schemeClr val="tx1"/>
                 </a:solidFill>
@@ -2246,7 +2255,7 @@
               <a:t>Homogeneous distributed database systems</a:t>
             </a:r>
             <a:r>
-              <a:rPr lang="en-US" sz="1200" b="1" kern="1200" dirty="0" smtClean="0">
+              <a:rPr lang="en-US" sz="1200" b="1" kern="1200" dirty="0">
                 <a:solidFill>
                   <a:schemeClr val="tx1"/>
                 </a:solidFill>
@@ -2258,7 +2267,7 @@
               <a:t> use the same DBMS software from multiple sites</a:t>
             </a:r>
             <a:r>
-              <a:rPr lang="en-US" sz="1200" kern="1200" dirty="0" smtClean="0">
+              <a:rPr lang="en-US" sz="1200" kern="1200" dirty="0">
                 <a:solidFill>
                   <a:schemeClr val="tx1"/>
                 </a:solidFill>
@@ -2270,7 +2279,7 @@
               <a:t>. </a:t>
             </a:r>
             <a:r>
-              <a:rPr lang="en-US" sz="1200" b="1" kern="1200" dirty="0" smtClean="0">
+              <a:rPr lang="en-US" sz="1200" b="1" kern="1200" dirty="0">
                 <a:solidFill>
                   <a:schemeClr val="tx1"/>
                 </a:solidFill>
@@ -2288,7 +2297,7 @@
               <a:buChar char="•"/>
             </a:pPr>
             <a:r>
-              <a:rPr lang="en-US" sz="1200" b="1" kern="1200" dirty="0" smtClean="0">
+              <a:rPr lang="en-US" sz="1200" b="1" kern="1200" dirty="0">
                 <a:solidFill>
                   <a:schemeClr val="tx1"/>
                 </a:solidFill>
@@ -2300,7 +2309,7 @@
               <a:t>In a </a:t>
             </a:r>
             <a:r>
-              <a:rPr lang="en-US" sz="1200" b="1" i="1" kern="1200" dirty="0" smtClean="0">
+              <a:rPr lang="en-US" sz="1200" b="1" i="1" kern="1200" dirty="0">
                 <a:solidFill>
                   <a:schemeClr val="tx1"/>
                 </a:solidFill>
@@ -2312,7 +2321,7 @@
               <a:t>heterogeneous distributed database system</a:t>
             </a:r>
             <a:r>
-              <a:rPr lang="en-US" sz="1200" b="1" kern="1200" dirty="0" smtClean="0">
+              <a:rPr lang="en-US" sz="1200" b="1" kern="1200" dirty="0">
                 <a:solidFill>
                   <a:schemeClr val="tx1"/>
                 </a:solidFill>
@@ -2323,7 +2332,7 @@
               </a:rPr>
               <a:t>, different sites might use different DBMS software, but there is additional common software to support data exchange between these sites</a:t>
             </a:r>
-            <a:endParaRPr lang="en-US" dirty="0" smtClean="0"/>
+            <a:endParaRPr lang="en-US" dirty="0"/>
           </a:p>
           <a:p>
             <a:endParaRPr lang="en-US" dirty="0"/>
@@ -2411,7 +2420,7 @@
           <a:lstStyle/>
           <a:p>
             <a:r>
-              <a:rPr lang="en-US" sz="1200" b="1" i="0" u="none" strike="noStrike" kern="1200" baseline="0" dirty="0" smtClean="0">
+              <a:rPr lang="en-US" sz="1200" b="1" i="0" u="none" strike="noStrike" kern="1200" baseline="0" dirty="0">
                 <a:solidFill>
                   <a:schemeClr val="tx1"/>
                 </a:solidFill>
@@ -2422,7 +2431,7 @@
               <a:t>A database can be of any size and of varying complexity. </a:t>
             </a:r>
             <a:r>
-              <a:rPr lang="en-US" sz="1200" b="0" i="0" u="none" strike="noStrike" kern="1200" baseline="0" dirty="0" smtClean="0">
+              <a:rPr lang="en-US" sz="1200" b="0" i="0" u="none" strike="noStrike" kern="1200" baseline="0" dirty="0">
                 <a:solidFill>
                   <a:schemeClr val="tx1"/>
                 </a:solidFill>
@@ -2517,7 +2526,7 @@
           <a:lstStyle/>
           <a:p>
             <a:r>
-              <a:rPr lang="en-US" sz="1200" b="0" i="0" u="none" strike="noStrike" kern="1200" baseline="0" dirty="0" smtClean="0">
+              <a:rPr lang="en-US" sz="1200" b="0" i="0" u="none" strike="noStrike" kern="1200" baseline="0" dirty="0">
                 <a:solidFill>
                   <a:schemeClr val="tx1"/>
                 </a:solidFill>
@@ -2528,7 +2537,7 @@
               <a:t>A typical </a:t>
             </a:r>
             <a:r>
-              <a:rPr lang="en-US" sz="1200" b="1" i="0" u="none" strike="noStrike" kern="1200" baseline="0" dirty="0" smtClean="0">
+              <a:rPr lang="en-US" sz="1200" b="1" i="0" u="none" strike="noStrike" kern="1200" baseline="0" dirty="0">
                 <a:solidFill>
                   <a:schemeClr val="tx1"/>
                 </a:solidFill>
@@ -2539,7 +2548,7 @@
               <a:t>single-user system </a:t>
             </a:r>
             <a:r>
-              <a:rPr lang="en-US" sz="1200" b="0" i="0" u="none" strike="noStrike" kern="1200" baseline="0" dirty="0" smtClean="0">
+              <a:rPr lang="en-US" sz="1200" b="0" i="0" u="none" strike="noStrike" kern="1200" baseline="0" dirty="0">
                 <a:solidFill>
                   <a:schemeClr val="tx1"/>
                 </a:solidFill>
@@ -2556,7 +2565,7 @@
               <a:buChar char="•"/>
             </a:pPr>
             <a:r>
-              <a:rPr lang="en-US" sz="1200" b="0" i="0" u="none" strike="noStrike" kern="1200" baseline="0" dirty="0" smtClean="0">
+              <a:rPr lang="en-US" sz="1200" b="0" i="0" u="none" strike="noStrike" kern="1200" baseline="0" dirty="0">
                 <a:solidFill>
                   <a:schemeClr val="tx1"/>
                 </a:solidFill>
@@ -2567,7 +2576,7 @@
               <a:t>A typical </a:t>
             </a:r>
             <a:r>
-              <a:rPr lang="en-US" sz="1200" b="1" i="0" u="none" strike="noStrike" kern="1200" baseline="0" dirty="0" smtClean="0">
+              <a:rPr lang="en-US" sz="1200" b="1" i="0" u="none" strike="noStrike" kern="1200" baseline="0" dirty="0">
                 <a:solidFill>
                   <a:schemeClr val="tx1"/>
                 </a:solidFill>
@@ -2578,7 +2587,7 @@
               <a:t>multiuser system</a:t>
             </a:r>
             <a:r>
-              <a:rPr lang="en-US" sz="1200" b="0" i="0" u="none" strike="noStrike" kern="1200" baseline="0" dirty="0" smtClean="0">
+              <a:rPr lang="en-US" sz="1200" b="0" i="0" u="none" strike="noStrike" kern="1200" baseline="0" dirty="0">
                 <a:solidFill>
                   <a:schemeClr val="tx1"/>
                 </a:solidFill>
@@ -2588,7 +2597,7 @@
               </a:rPr>
               <a:t>, on the other hand, has more disks and more memory, may have multiple CPUs and has a multiuser operating system. It serves a large number of users who are connected to the system via terminals.</a:t>
             </a:r>
-            <a:endParaRPr lang="en-US" dirty="0" smtClean="0"/>
+            <a:endParaRPr lang="en-US" dirty="0"/>
           </a:p>
           <a:p>
             <a:endParaRPr lang="en-US" dirty="0"/>
@@ -2676,11 +2685,11 @@
           <a:lstStyle/>
           <a:p>
             <a:r>
-              <a:rPr lang="en-US" dirty="0" err="1" smtClean="0"/>
+              <a:rPr lang="en-US" dirty="0" err="1"/>
               <a:t>Navathe</a:t>
             </a:r>
             <a:r>
-              <a:rPr lang="en-US" dirty="0" smtClean="0"/>
+              <a:rPr lang="en-US" dirty="0"/>
               <a:t> page no 471</a:t>
             </a:r>
           </a:p>
@@ -2703,7 +2712,7 @@
               <a:defRPr/>
             </a:pPr>
             <a:r>
-              <a:rPr lang="en-US" sz="1200" b="1" kern="1200" dirty="0" smtClean="0">
+              <a:rPr lang="en-US" sz="1200" b="1" kern="1200" dirty="0">
                 <a:solidFill>
                   <a:schemeClr val="tx1"/>
                 </a:solidFill>
@@ -2715,7 +2724,7 @@
               <a:t>Why is Database Design:</a:t>
             </a:r>
             <a:r>
-              <a:rPr lang="en-US" sz="1200" b="1" kern="1200" baseline="0" dirty="0" smtClean="0">
+              <a:rPr lang="en-US" sz="1200" b="1" kern="1200" baseline="0" dirty="0">
                 <a:solidFill>
                   <a:schemeClr val="tx1"/>
                 </a:solidFill>
@@ -2746,7 +2755,7 @@
               <a:defRPr/>
             </a:pPr>
             <a:r>
-              <a:rPr lang="en-US" sz="1200" b="1" kern="1200" dirty="0" smtClean="0">
+              <a:rPr lang="en-US" sz="1200" b="1" kern="1200" dirty="0">
                 <a:solidFill>
                   <a:schemeClr val="tx1"/>
                 </a:solidFill>
@@ -2757,7 +2766,7 @@
               </a:rPr>
               <a:t>Database design can be generally defined as a collection of tasks or processes that enhance the designing, development, implementation, and maintenance of enterprise data management system</a:t>
             </a:r>
-            <a:endParaRPr lang="en-US" sz="1200" b="1" kern="1200" baseline="0" dirty="0" smtClean="0">
+            <a:endParaRPr lang="en-US" sz="1200" b="1" kern="1200" baseline="0" dirty="0">
               <a:solidFill>
                 <a:schemeClr val="tx1"/>
               </a:solidFill>
@@ -2786,7 +2795,7 @@
               <a:defRPr/>
             </a:pPr>
             <a:r>
-              <a:rPr lang="en-US" sz="1200" b="1" kern="1200" baseline="0" dirty="0" smtClean="0">
+              <a:rPr lang="en-US" sz="1200" b="1" kern="1200" baseline="0" dirty="0">
                 <a:solidFill>
                   <a:schemeClr val="tx1"/>
                 </a:solidFill>
@@ -2797,7 +2806,7 @@
               </a:rPr>
               <a:t>It simply means mapping of conceptual model to implementation model.</a:t>
             </a:r>
-            <a:endParaRPr lang="en-US" sz="1200" b="1" kern="1200" dirty="0" smtClean="0">
+            <a:endParaRPr lang="en-US" sz="1200" b="1" kern="1200" dirty="0">
               <a:solidFill>
                 <a:schemeClr val="tx1"/>
               </a:solidFill>
@@ -2808,11 +2817,11 @@
             </a:endParaRPr>
           </a:p>
           <a:p>
-            <a:endParaRPr lang="en-US" dirty="0" smtClean="0"/>
-          </a:p>
-          <a:p>
-            <a:r>
-              <a:rPr lang="en-US" sz="1200" b="1" i="0" u="none" strike="noStrike" kern="1200" baseline="0" dirty="0" smtClean="0">
+            <a:endParaRPr lang="en-US" dirty="0"/>
+          </a:p>
+          <a:p>
+            <a:r>
+              <a:rPr lang="en-US" sz="1200" b="1" i="0" u="none" strike="noStrike" kern="1200" baseline="0" dirty="0">
                 <a:solidFill>
                   <a:schemeClr val="tx1"/>
                 </a:solidFill>
@@ -2825,7 +2834,7 @@
           </a:p>
           <a:p>
             <a:r>
-              <a:rPr lang="en-US" sz="1200" b="0" i="0" u="none" strike="noStrike" kern="1200" baseline="0" dirty="0" smtClean="0">
+              <a:rPr lang="en-US" sz="1200" b="0" i="0" u="none" strike="noStrike" kern="1200" baseline="0" dirty="0">
                 <a:solidFill>
                   <a:schemeClr val="tx1"/>
                 </a:solidFill>
@@ -2838,7 +2847,7 @@
           </a:p>
           <a:p>
             <a:r>
-              <a:rPr lang="en-US" sz="1200" b="0" i="0" u="none" strike="noStrike" kern="1200" baseline="0" dirty="0" smtClean="0">
+              <a:rPr lang="en-US" sz="1200" b="0" i="0" u="none" strike="noStrike" kern="1200" baseline="0" dirty="0">
                 <a:solidFill>
                   <a:schemeClr val="tx1"/>
                 </a:solidFill>
@@ -2851,7 +2860,7 @@
           </a:p>
           <a:p>
             <a:r>
-              <a:rPr lang="en-US" sz="1200" b="0" i="0" u="none" strike="noStrike" kern="1200" baseline="0" dirty="0" smtClean="0">
+              <a:rPr lang="en-US" sz="1200" b="0" i="0" u="none" strike="noStrike" kern="1200" baseline="0" dirty="0">
                 <a:solidFill>
                   <a:schemeClr val="tx1"/>
                 </a:solidFill>
@@ -3469,7 +3478,7 @@
               <a:defRPr/>
             </a:pPr>
             <a:r>
-              <a:rPr lang="en-US" sz="1200" kern="1200" dirty="0" smtClean="0">
+              <a:rPr lang="en-US" sz="1200" kern="1200" dirty="0">
                 <a:solidFill>
                   <a:schemeClr val="tx1"/>
                 </a:solidFill>
@@ -3481,7 +3490,7 @@
               <a:t>The primary goal of a DBMS is to provide a way to store and retrieve database information that is both </a:t>
             </a:r>
             <a:r>
-              <a:rPr lang="en-US" sz="1200" i="1" kern="1200" dirty="0" smtClean="0">
+              <a:rPr lang="en-US" sz="1200" i="1" kern="1200" dirty="0">
                 <a:solidFill>
                   <a:schemeClr val="tx1"/>
                 </a:solidFill>
@@ -3493,7 +3502,7 @@
               <a:t>convenient</a:t>
             </a:r>
             <a:r>
-              <a:rPr lang="en-US" sz="1200" kern="1200" dirty="0" smtClean="0">
+              <a:rPr lang="en-US" sz="1200" kern="1200" dirty="0">
                 <a:solidFill>
                   <a:schemeClr val="tx1"/>
                 </a:solidFill>
@@ -3505,7 +3514,7 @@
               <a:t> and </a:t>
             </a:r>
             <a:r>
-              <a:rPr lang="en-US" sz="1200" i="1" kern="1200" dirty="0" smtClean="0">
+              <a:rPr lang="en-US" sz="1200" i="1" kern="1200" dirty="0">
                 <a:solidFill>
                   <a:schemeClr val="tx1"/>
                 </a:solidFill>
@@ -3517,7 +3526,7 @@
               <a:t>efficient</a:t>
             </a:r>
             <a:r>
-              <a:rPr lang="en-US" sz="1200" kern="1200" dirty="0" smtClean="0">
+              <a:rPr lang="en-US" sz="1200" kern="1200" dirty="0">
                 <a:solidFill>
                   <a:schemeClr val="tx1"/>
                 </a:solidFill>
@@ -3615,7 +3624,7 @@
           <a:lstStyle/>
           <a:p>
             <a:r>
-              <a:rPr lang="en-US" sz="1200" kern="1200" dirty="0" smtClean="0">
+              <a:rPr lang="en-US" sz="1200" kern="1200" dirty="0">
                 <a:solidFill>
                   <a:schemeClr val="tx1"/>
                 </a:solidFill>
@@ -3629,7 +3638,7 @@
           </a:p>
           <a:p>
             <a:r>
-              <a:rPr lang="en-US" sz="1200" kern="1200" dirty="0" smtClean="0">
+              <a:rPr lang="en-US" sz="1200" kern="1200" dirty="0">
                 <a:solidFill>
                   <a:schemeClr val="tx1"/>
                 </a:solidFill>
@@ -3660,7 +3669,7 @@
               <a:defRPr/>
             </a:pPr>
             <a:r>
-              <a:rPr lang="en-US" sz="1200" kern="1200" dirty="0" smtClean="0">
+              <a:rPr lang="en-US" sz="1200" kern="1200" dirty="0">
                 <a:solidFill>
                   <a:schemeClr val="tx1"/>
                 </a:solidFill>
@@ -3675,7 +3684,7 @@
           <a:p>
             <a:pPr lvl="0"/>
             <a:r>
-              <a:rPr lang="en-US" sz="1200" kern="1200" dirty="0" smtClean="0">
+              <a:rPr lang="en-US" sz="1200" kern="1200" dirty="0">
                 <a:solidFill>
                   <a:schemeClr val="tx1"/>
                 </a:solidFill>
@@ -3689,7 +3698,7 @@
           </a:p>
           <a:p>
             <a:r>
-              <a:rPr lang="en-US" sz="1200" kern="1200" dirty="0" smtClean="0">
+              <a:rPr lang="en-US" sz="1200" kern="1200" dirty="0">
                 <a:solidFill>
                   <a:schemeClr val="tx1"/>
                 </a:solidFill>
@@ -3804,7 +3813,7 @@
               <a:defRPr/>
             </a:pPr>
             <a:r>
-              <a:rPr lang="en-US" sz="1200" kern="1200" dirty="0" smtClean="0">
+              <a:rPr lang="en-US" sz="1200" kern="1200" dirty="0">
                 <a:solidFill>
                   <a:schemeClr val="tx1"/>
                 </a:solidFill>
@@ -3816,7 +3825,7 @@
               <a:t>1]Ex: in IRCTC, if we are looking for certain train information( that is 1 kb of data) then with file processing system we will get a file containing entire train information as retrieval results which may be in GB’s. So this is not required as it requires unnecessarily system’s memory. While if we use DBMS then it allows us to query and get required 1 kb data only. </a:t>
             </a:r>
             <a:r>
-              <a:rPr lang="en-US" sz="1200" b="1" kern="1200" dirty="0" smtClean="0">
+              <a:rPr lang="en-US" sz="1200" b="1" kern="1200" dirty="0">
                 <a:solidFill>
                   <a:schemeClr val="tx1"/>
                 </a:solidFill>
@@ -3828,7 +3837,7 @@
               <a:t>So DBMS makes my searching faster and memory utilization more efficient.</a:t>
             </a:r>
             <a:r>
-              <a:rPr lang="en-US" sz="1200" kern="1200" dirty="0" smtClean="0">
+              <a:rPr lang="en-US" sz="1200" kern="1200" dirty="0">
                 <a:solidFill>
                   <a:schemeClr val="tx1"/>
                 </a:solidFill>
@@ -3840,7 +3849,7 @@
               <a:t> Also in case of file system, if you want to access data you </a:t>
             </a:r>
             <a:r>
-              <a:rPr lang="en-US" sz="1200" b="1" kern="1200" dirty="0" smtClean="0">
+              <a:rPr lang="en-US" sz="1200" b="1" kern="1200" dirty="0">
                 <a:solidFill>
                   <a:schemeClr val="tx1"/>
                 </a:solidFill>
@@ -3852,7 +3861,7 @@
               <a:t>must be aware of its metadata(data about data)</a:t>
             </a:r>
             <a:r>
-              <a:rPr lang="en-US" sz="1200" kern="1200" dirty="0" smtClean="0">
+              <a:rPr lang="en-US" sz="1200" kern="1200" dirty="0">
                 <a:solidFill>
                   <a:schemeClr val="tx1"/>
                 </a:solidFill>
@@ -3882,7 +3891,7 @@
               <a:tabLst/>
               <a:defRPr/>
             </a:pPr>
-            <a:endParaRPr lang="en-US" sz="1200" b="1" kern="1200" dirty="0" smtClean="0">
+            <a:endParaRPr lang="en-US" sz="1200" b="1" kern="1200" dirty="0">
               <a:solidFill>
                 <a:schemeClr val="tx1"/>
               </a:solidFill>
@@ -3995,7 +4004,7 @@
               <a:defRPr/>
             </a:pPr>
             <a:r>
-              <a:rPr lang="en-US" sz="1200" kern="1200" dirty="0" smtClean="0">
+              <a:rPr lang="en-US" sz="1200" kern="1200" dirty="0">
                 <a:solidFill>
                   <a:schemeClr val="tx1"/>
                 </a:solidFill>
@@ -4007,7 +4016,7 @@
               <a:t>The </a:t>
             </a:r>
             <a:r>
-              <a:rPr lang="en-US" sz="1200" b="1" kern="1200" dirty="0" smtClean="0">
+              <a:rPr lang="en-US" sz="1200" b="1" kern="1200" dirty="0">
                 <a:solidFill>
                   <a:schemeClr val="tx1"/>
                 </a:solidFill>
@@ -4019,7 +4028,7 @@
               <a:t>ACID</a:t>
             </a:r>
             <a:r>
-              <a:rPr lang="en-US" sz="1200" kern="1200" dirty="0" smtClean="0">
+              <a:rPr lang="en-US" sz="1200" kern="1200" dirty="0">
                 <a:solidFill>
                   <a:schemeClr val="tx1"/>
                 </a:solidFill>
@@ -4118,7 +4127,7 @@
           <a:p>
             <a:pPr fontAlgn="base"/>
             <a:r>
-              <a:rPr lang="en-US" sz="1200" b="1" kern="1200" dirty="0" smtClean="0">
+              <a:rPr lang="en-US" sz="1200" b="1" kern="1200" dirty="0">
                 <a:solidFill>
                   <a:schemeClr val="tx1"/>
                 </a:solidFill>
@@ -4129,7 +4138,7 @@
               </a:rPr>
               <a:t>Atomicity:</a:t>
             </a:r>
-            <a:endParaRPr lang="en-US" sz="1200" kern="1200" dirty="0" smtClean="0">
+            <a:endParaRPr lang="en-US" sz="1200" kern="1200" dirty="0">
               <a:solidFill>
                 <a:schemeClr val="tx1"/>
               </a:solidFill>
@@ -4141,7 +4150,7 @@
           </a:p>
           <a:p>
             <a:r>
-              <a:rPr lang="en-US" sz="1200" kern="1200" dirty="0" smtClean="0">
+              <a:rPr lang="en-US" sz="1200" kern="1200" dirty="0">
                 <a:solidFill>
                   <a:schemeClr val="tx1"/>
                 </a:solidFill>
@@ -4155,7 +4164,7 @@
           </a:p>
           <a:p>
             <a:r>
-              <a:rPr lang="en-US" sz="1200" kern="1200" dirty="0" smtClean="0">
+              <a:rPr lang="en-US" sz="1200" kern="1200" dirty="0">
                 <a:solidFill>
                   <a:schemeClr val="tx1"/>
                 </a:solidFill>
@@ -4167,7 +4176,7 @@
               <a:t> </a:t>
             </a:r>
             <a:br>
-              <a:rPr lang="en-US" sz="1200" kern="1200" dirty="0" smtClean="0">
+              <a:rPr lang="en-US" sz="1200" kern="1200" dirty="0">
                 <a:solidFill>
                   <a:schemeClr val="tx1"/>
                 </a:solidFill>
@@ -4178,7 +4187,7 @@
               </a:rPr>
             </a:br>
             <a:r>
-              <a:rPr lang="en-US" sz="1200" kern="1200" dirty="0" smtClean="0">
+              <a:rPr lang="en-US" sz="1200" kern="1200" dirty="0">
                 <a:solidFill>
                   <a:schemeClr val="tx1"/>
                 </a:solidFill>
@@ -4190,7 +4199,7 @@
               <a:t>—</a:t>
             </a:r>
             <a:r>
-              <a:rPr lang="en-US" sz="1200" b="1" kern="1200" dirty="0" smtClean="0">
+              <a:rPr lang="en-US" sz="1200" b="1" kern="1200" dirty="0">
                 <a:solidFill>
                   <a:schemeClr val="tx1"/>
                 </a:solidFill>
@@ -4202,7 +4211,7 @@
               <a:t>Abort</a:t>
             </a:r>
             <a:r>
-              <a:rPr lang="en-US" sz="1200" kern="1200" dirty="0" smtClean="0">
+              <a:rPr lang="en-US" sz="1200" kern="1200" dirty="0">
                 <a:solidFill>
                   <a:schemeClr val="tx1"/>
                 </a:solidFill>
@@ -4216,7 +4225,7 @@
           </a:p>
           <a:p>
             <a:r>
-              <a:rPr lang="en-US" sz="1200" kern="1200" dirty="0" smtClean="0">
+              <a:rPr lang="en-US" sz="1200" kern="1200" dirty="0">
                 <a:solidFill>
                   <a:schemeClr val="tx1"/>
                 </a:solidFill>
@@ -4228,7 +4237,7 @@
               <a:t> </a:t>
             </a:r>
             <a:br>
-              <a:rPr lang="en-US" sz="1200" kern="1200" dirty="0" smtClean="0">
+              <a:rPr lang="en-US" sz="1200" kern="1200" dirty="0">
                 <a:solidFill>
                   <a:schemeClr val="tx1"/>
                 </a:solidFill>
@@ -4239,7 +4248,7 @@
               </a:rPr>
             </a:br>
             <a:r>
-              <a:rPr lang="en-US" sz="1200" kern="1200" dirty="0" smtClean="0">
+              <a:rPr lang="en-US" sz="1200" kern="1200" dirty="0">
                 <a:solidFill>
                   <a:schemeClr val="tx1"/>
                 </a:solidFill>
@@ -4251,7 +4260,7 @@
               <a:t>—</a:t>
             </a:r>
             <a:r>
-              <a:rPr lang="en-US" sz="1200" b="1" kern="1200" dirty="0" smtClean="0">
+              <a:rPr lang="en-US" sz="1200" b="1" kern="1200" dirty="0">
                 <a:solidFill>
                   <a:schemeClr val="tx1"/>
                 </a:solidFill>
@@ -4263,7 +4272,7 @@
               <a:t>Commit</a:t>
             </a:r>
             <a:r>
-              <a:rPr lang="en-US" sz="1200" kern="1200" dirty="0" smtClean="0">
+              <a:rPr lang="en-US" sz="1200" kern="1200" dirty="0">
                 <a:solidFill>
                   <a:schemeClr val="tx1"/>
                 </a:solidFill>
@@ -4277,7 +4286,7 @@
           </a:p>
           <a:p>
             <a:r>
-              <a:rPr lang="en-US" sz="1200" kern="1200" dirty="0" smtClean="0">
+              <a:rPr lang="en-US" sz="1200" kern="1200" dirty="0">
                 <a:solidFill>
                   <a:schemeClr val="tx1"/>
                 </a:solidFill>
@@ -4289,7 +4298,7 @@
               <a:t> </a:t>
             </a:r>
             <a:br>
-              <a:rPr lang="en-US" sz="1200" kern="1200" dirty="0" smtClean="0">
+              <a:rPr lang="en-US" sz="1200" kern="1200" dirty="0">
                 <a:solidFill>
                   <a:schemeClr val="tx1"/>
                 </a:solidFill>
@@ -4300,7 +4309,7 @@
               </a:rPr>
             </a:br>
             <a:r>
-              <a:rPr lang="en-US" sz="1200" kern="1200" dirty="0" smtClean="0">
+              <a:rPr lang="en-US" sz="1200" kern="1200" dirty="0">
                 <a:solidFill>
                   <a:schemeClr val="tx1"/>
                 </a:solidFill>
@@ -4313,11 +4322,11 @@
             </a:r>
           </a:p>
           <a:p>
-            <a:endParaRPr lang="en-US" dirty="0" smtClean="0"/>
-          </a:p>
-          <a:p>
-            <a:r>
-              <a:rPr lang="en-US" sz="1200" b="0" i="0" kern="1200" dirty="0" smtClean="0">
+            <a:endParaRPr lang="en-US" dirty="0"/>
+          </a:p>
+          <a:p>
+            <a:r>
+              <a:rPr lang="en-US" sz="1200" b="0" i="0" kern="1200" dirty="0">
                 <a:solidFill>
                   <a:schemeClr val="tx1"/>
                 </a:solidFill>
@@ -4329,7 +4338,7 @@
               <a:t>The term 'isolation' means separation. In DBMS, </a:t>
             </a:r>
             <a:r>
-              <a:rPr lang="en-US" sz="1200" b="1" i="0" kern="1200" dirty="0" smtClean="0">
+              <a:rPr lang="en-US" sz="1200" b="1" i="0" kern="1200" dirty="0">
                 <a:solidFill>
                   <a:schemeClr val="tx1"/>
                 </a:solidFill>
@@ -4341,7 +4350,7 @@
               <a:t>Isolation is the property of a database where no data should affect the other one and may occur concurrently.</a:t>
             </a:r>
             <a:r>
-              <a:rPr lang="en-US" sz="1200" b="0" i="0" kern="1200" dirty="0" smtClean="0">
+              <a:rPr lang="en-US" sz="1200" b="0" i="0" kern="1200" dirty="0">
                 <a:solidFill>
                   <a:schemeClr val="tx1"/>
                 </a:solidFill>
@@ -4353,7 +4362,7 @@
               <a:t>  Any changes that occur in any particular transaction will not be seen by other transactions until the change is not committed in the memory.</a:t>
             </a:r>
             <a:r>
-              <a:rPr lang="en-US" sz="1200" b="1" i="0" kern="1200" dirty="0" smtClean="0">
+              <a:rPr lang="en-US" sz="1200" b="1" i="0" kern="1200" dirty="0">
                 <a:solidFill>
                   <a:schemeClr val="tx1"/>
                 </a:solidFill>
@@ -4365,7 +4374,7 @@
               <a:t> Example:</a:t>
             </a:r>
             <a:r>
-              <a:rPr lang="en-US" sz="1200" b="0" i="0" kern="1200" dirty="0" smtClean="0">
+              <a:rPr lang="en-US" sz="1200" b="0" i="0" kern="1200" dirty="0">
                 <a:solidFill>
                   <a:schemeClr val="tx1"/>
                 </a:solidFill>
@@ -4379,7 +4388,7 @@
           </a:p>
           <a:p>
             <a:r>
-              <a:rPr lang="en-US" sz="1200" b="1" i="1" kern="1200" dirty="0" smtClean="0">
+              <a:rPr lang="en-US" sz="1200" b="1" i="1" kern="1200" dirty="0">
                 <a:solidFill>
                   <a:schemeClr val="tx1"/>
                 </a:solidFill>
@@ -4390,7 +4399,7 @@
               </a:rPr>
               <a:t>.    Database Integrity</a:t>
             </a:r>
-            <a:endParaRPr lang="en-US" sz="1200" kern="1200" dirty="0" smtClean="0">
+            <a:endParaRPr lang="en-US" sz="1200" kern="1200" dirty="0">
               <a:solidFill>
                 <a:schemeClr val="tx1"/>
               </a:solidFill>
@@ -4402,7 +4411,7 @@
           </a:p>
           <a:p>
             <a:r>
-              <a:rPr lang="en-US" sz="1200" kern="1200" dirty="0" smtClean="0">
+              <a:rPr lang="en-US" sz="1200" kern="1200" dirty="0">
                 <a:solidFill>
                   <a:schemeClr val="tx1"/>
                 </a:solidFill>
@@ -4498,7 +4507,7 @@
           <a:lstStyle/>
           <a:p>
             <a:r>
-              <a:rPr lang="en-US" sz="1200" kern="1200" dirty="0" smtClean="0">
+              <a:rPr lang="en-US" sz="1200" kern="1200" dirty="0">
                 <a:solidFill>
                   <a:schemeClr val="tx1"/>
                 </a:solidFill>
@@ -4513,7 +4522,7 @@
           <a:p>
             <a:pPr lvl="0"/>
             <a:r>
-              <a:rPr lang="en-US" sz="1200" b="1" kern="1200" dirty="0" smtClean="0">
+              <a:rPr lang="en-US" sz="1200" b="1" kern="1200" dirty="0">
                 <a:solidFill>
                   <a:schemeClr val="tx1"/>
                 </a:solidFill>
@@ -4525,7 +4534,7 @@
               <a:t>Cost of Hardware and Software :</a:t>
             </a:r>
             <a:r>
-              <a:rPr lang="en-US" sz="1200" kern="1200" dirty="0" smtClean="0">
+              <a:rPr lang="en-US" sz="1200" kern="1200" dirty="0">
                 <a:solidFill>
                   <a:schemeClr val="tx1"/>
                 </a:solidFill>
@@ -4540,7 +4549,7 @@
           <a:p>
             <a:pPr lvl="0"/>
             <a:r>
-              <a:rPr lang="en-US" sz="1200" b="1" kern="1200" dirty="0" smtClean="0">
+              <a:rPr lang="en-US" sz="1200" b="1" kern="1200" dirty="0">
                 <a:solidFill>
                   <a:schemeClr val="tx1"/>
                 </a:solidFill>
@@ -4552,7 +4561,7 @@
               <a:t>Size:</a:t>
             </a:r>
             <a:r>
-              <a:rPr lang="en-US" sz="1200" kern="1200" dirty="0" smtClean="0">
+              <a:rPr lang="en-US" sz="1200" kern="1200" dirty="0">
                 <a:solidFill>
                   <a:schemeClr val="tx1"/>
                 </a:solidFill>
@@ -4567,7 +4576,7 @@
           <a:p>
             <a:pPr lvl="0"/>
             <a:r>
-              <a:rPr lang="en-US" sz="1200" b="1" kern="1200" dirty="0" smtClean="0">
+              <a:rPr lang="en-US" sz="1200" b="1" kern="1200" dirty="0">
                 <a:solidFill>
                   <a:schemeClr val="tx1"/>
                 </a:solidFill>
@@ -4579,7 +4588,7 @@
               <a:t>Complexity:</a:t>
             </a:r>
             <a:r>
-              <a:rPr lang="en-US" sz="1200" kern="1200" dirty="0" smtClean="0">
+              <a:rPr lang="en-US" sz="1200" kern="1200" dirty="0">
                 <a:solidFill>
                   <a:schemeClr val="tx1"/>
                 </a:solidFill>
@@ -4594,7 +4603,7 @@
           <a:p>
             <a:pPr lvl="0"/>
             <a:r>
-              <a:rPr lang="en-US" sz="1200" b="1" kern="1200" dirty="0" smtClean="0">
+              <a:rPr lang="en-US" sz="1200" b="1" kern="1200" dirty="0">
                 <a:solidFill>
                   <a:schemeClr val="tx1"/>
                 </a:solidFill>
@@ -4606,7 +4615,7 @@
               <a:t>Higher impact of failure:</a:t>
             </a:r>
             <a:r>
-              <a:rPr lang="en-US" sz="1200" kern="1200" dirty="0" smtClean="0">
+              <a:rPr lang="en-US" sz="1200" kern="1200" dirty="0">
                 <a:solidFill>
                   <a:schemeClr val="tx1"/>
                 </a:solidFill>
@@ -4792,7 +4801,7 @@
           </a:lstStyle>
           <a:p>
             <a:r>
-              <a:rPr lang="en-US" smtClean="0"/>
+              <a:rPr lang="en-US"/>
               <a:t>Click to edit Master title style</a:t>
             </a:r>
             <a:endParaRPr lang="en-US" dirty="0"/>
@@ -4913,7 +4922,7 @@
           </a:lstStyle>
           <a:p>
             <a:r>
-              <a:rPr lang="en-US" smtClean="0"/>
+              <a:rPr lang="en-US"/>
               <a:t>Click to edit Master subtitle style</a:t>
             </a:r>
             <a:endParaRPr lang="en-US" dirty="0"/>
@@ -4938,7 +4947,7 @@
             <a:fld id="{1D8BD707-D9CF-40AE-B4C6-C98DA3205C09}" type="datetimeFigureOut">
               <a:rPr lang="en-US" smtClean="0"/>
               <a:pPr/>
-              <a:t>29/08/2022</a:t>
+              <a:t>9/7/2023</a:t>
             </a:fld>
             <a:endParaRPr lang="en-US"/>
           </a:p>
@@ -5028,10 +5037,9 @@
           <a:lstStyle/>
           <a:p>
             <a:r>
-              <a:rPr lang="en-US" smtClean="0"/>
+              <a:rPr lang="en-US"/>
               <a:t>Click to edit Master title style</a:t>
             </a:r>
-            <a:endParaRPr lang="en-US"/>
           </a:p>
         </p:txBody>
       </p:sp>
@@ -5052,38 +5060,37 @@
           <a:p>
             <a:pPr lvl="0"/>
             <a:r>
-              <a:rPr lang="en-US" smtClean="0"/>
+              <a:rPr lang="en-US"/>
               <a:t>Click to edit Master text styles</a:t>
             </a:r>
           </a:p>
           <a:p>
             <a:pPr lvl="1"/>
             <a:r>
-              <a:rPr lang="en-US" smtClean="0"/>
+              <a:rPr lang="en-US"/>
               <a:t>Second level</a:t>
             </a:r>
           </a:p>
           <a:p>
             <a:pPr lvl="2"/>
             <a:r>
-              <a:rPr lang="en-US" smtClean="0"/>
+              <a:rPr lang="en-US"/>
               <a:t>Third level</a:t>
             </a:r>
           </a:p>
           <a:p>
             <a:pPr lvl="3"/>
             <a:r>
-              <a:rPr lang="en-US" smtClean="0"/>
+              <a:rPr lang="en-US"/>
               <a:t>Fourth level</a:t>
             </a:r>
           </a:p>
           <a:p>
             <a:pPr lvl="4"/>
             <a:r>
-              <a:rPr lang="en-US" smtClean="0"/>
+              <a:rPr lang="en-US"/>
               <a:t>Fifth level</a:t>
             </a:r>
-            <a:endParaRPr lang="en-US"/>
           </a:p>
         </p:txBody>
       </p:sp>
@@ -5105,7 +5112,7 @@
             <a:fld id="{1D8BD707-D9CF-40AE-B4C6-C98DA3205C09}" type="datetimeFigureOut">
               <a:rPr lang="en-US" smtClean="0"/>
               <a:pPr/>
-              <a:t>29/08/2022</a:t>
+              <a:t>9/7/2023</a:t>
             </a:fld>
             <a:endParaRPr lang="en-US"/>
           </a:p>
@@ -5200,7 +5207,7 @@
           <a:lstStyle/>
           <a:p>
             <a:r>
-              <a:rPr lang="en-US" smtClean="0"/>
+              <a:rPr lang="en-US"/>
               <a:t>Click to edit Master title style</a:t>
             </a:r>
             <a:endParaRPr lang="en-US" dirty="0"/>
@@ -5229,38 +5236,37 @@
           <a:p>
             <a:pPr lvl="0"/>
             <a:r>
-              <a:rPr lang="en-US" smtClean="0"/>
+              <a:rPr lang="en-US"/>
               <a:t>Click to edit Master text styles</a:t>
             </a:r>
           </a:p>
           <a:p>
             <a:pPr lvl="1"/>
             <a:r>
-              <a:rPr lang="en-US" smtClean="0"/>
+              <a:rPr lang="en-US"/>
               <a:t>Second level</a:t>
             </a:r>
           </a:p>
           <a:p>
             <a:pPr lvl="2"/>
             <a:r>
-              <a:rPr lang="en-US" smtClean="0"/>
+              <a:rPr lang="en-US"/>
               <a:t>Third level</a:t>
             </a:r>
           </a:p>
           <a:p>
             <a:pPr lvl="3"/>
             <a:r>
-              <a:rPr lang="en-US" smtClean="0"/>
+              <a:rPr lang="en-US"/>
               <a:t>Fourth level</a:t>
             </a:r>
           </a:p>
           <a:p>
             <a:pPr lvl="4"/>
             <a:r>
-              <a:rPr lang="en-US" smtClean="0"/>
+              <a:rPr lang="en-US"/>
               <a:t>Fifth level</a:t>
             </a:r>
-            <a:endParaRPr lang="en-US"/>
           </a:p>
         </p:txBody>
       </p:sp>
@@ -5282,7 +5288,7 @@
             <a:fld id="{1D8BD707-D9CF-40AE-B4C6-C98DA3205C09}" type="datetimeFigureOut">
               <a:rPr lang="en-US" smtClean="0"/>
               <a:pPr/>
-              <a:t>29/08/2022</a:t>
+              <a:t>9/7/2023</a:t>
             </a:fld>
             <a:endParaRPr lang="en-US"/>
           </a:p>
@@ -5372,10 +5378,9 @@
           <a:lstStyle/>
           <a:p>
             <a:r>
-              <a:rPr lang="en-US" smtClean="0"/>
+              <a:rPr lang="en-US"/>
               <a:t>Click to edit Master title style</a:t>
             </a:r>
-            <a:endParaRPr lang="en-US"/>
           </a:p>
         </p:txBody>
       </p:sp>
@@ -5396,38 +5401,37 @@
           <a:p>
             <a:pPr lvl="0"/>
             <a:r>
-              <a:rPr lang="en-US" smtClean="0"/>
+              <a:rPr lang="en-US"/>
               <a:t>Click to edit Master text styles</a:t>
             </a:r>
           </a:p>
           <a:p>
             <a:pPr lvl="1"/>
             <a:r>
-              <a:rPr lang="en-US" smtClean="0"/>
+              <a:rPr lang="en-US"/>
               <a:t>Second level</a:t>
             </a:r>
           </a:p>
           <a:p>
             <a:pPr lvl="2"/>
             <a:r>
-              <a:rPr lang="en-US" smtClean="0"/>
+              <a:rPr lang="en-US"/>
               <a:t>Third level</a:t>
             </a:r>
           </a:p>
           <a:p>
             <a:pPr lvl="3"/>
             <a:r>
-              <a:rPr lang="en-US" smtClean="0"/>
+              <a:rPr lang="en-US"/>
               <a:t>Fourth level</a:t>
             </a:r>
           </a:p>
           <a:p>
             <a:pPr lvl="4"/>
             <a:r>
-              <a:rPr lang="en-US" smtClean="0"/>
+              <a:rPr lang="en-US"/>
               <a:t>Fifth level</a:t>
             </a:r>
-            <a:endParaRPr lang="en-US"/>
           </a:p>
         </p:txBody>
       </p:sp>
@@ -5449,7 +5453,7 @@
             <a:fld id="{1D8BD707-D9CF-40AE-B4C6-C98DA3205C09}" type="datetimeFigureOut">
               <a:rPr lang="en-US" smtClean="0"/>
               <a:pPr/>
-              <a:t>29/08/2022</a:t>
+              <a:t>9/7/2023</a:t>
             </a:fld>
             <a:endParaRPr lang="en-US"/>
           </a:p>
@@ -5548,7 +5552,7 @@
           </a:lstStyle>
           <a:p>
             <a:r>
-              <a:rPr lang="en-US" smtClean="0"/>
+              <a:rPr lang="en-US"/>
               <a:t>Click to edit Master title style</a:t>
             </a:r>
             <a:endParaRPr lang="en-US" dirty="0"/>
@@ -5668,7 +5672,7 @@
           <a:p>
             <a:pPr lvl="0"/>
             <a:r>
-              <a:rPr lang="en-US" smtClean="0"/>
+              <a:rPr lang="en-US"/>
               <a:t>Click to edit Master text styles</a:t>
             </a:r>
           </a:p>
@@ -5692,7 +5696,7 @@
             <a:fld id="{1D8BD707-D9CF-40AE-B4C6-C98DA3205C09}" type="datetimeFigureOut">
               <a:rPr lang="en-US" smtClean="0"/>
               <a:pPr/>
-              <a:t>29/08/2022</a:t>
+              <a:t>9/7/2023</a:t>
             </a:fld>
             <a:endParaRPr lang="en-US"/>
           </a:p>
@@ -5782,10 +5786,9 @@
           <a:lstStyle/>
           <a:p>
             <a:r>
-              <a:rPr lang="en-US" smtClean="0"/>
+              <a:rPr lang="en-US"/>
               <a:t>Click to edit Master title style</a:t>
             </a:r>
-            <a:endParaRPr lang="en-US"/>
           </a:p>
         </p:txBody>
       </p:sp>
@@ -5839,35 +5842,35 @@
           <a:p>
             <a:pPr lvl="0"/>
             <a:r>
-              <a:rPr lang="en-US" smtClean="0"/>
+              <a:rPr lang="en-US"/>
               <a:t>Click to edit Master text styles</a:t>
             </a:r>
           </a:p>
           <a:p>
             <a:pPr lvl="1"/>
             <a:r>
-              <a:rPr lang="en-US" smtClean="0"/>
+              <a:rPr lang="en-US"/>
               <a:t>Second level</a:t>
             </a:r>
           </a:p>
           <a:p>
             <a:pPr lvl="2"/>
             <a:r>
-              <a:rPr lang="en-US" smtClean="0"/>
+              <a:rPr lang="en-US"/>
               <a:t>Third level</a:t>
             </a:r>
           </a:p>
           <a:p>
             <a:pPr lvl="3"/>
             <a:r>
-              <a:rPr lang="en-US" smtClean="0"/>
+              <a:rPr lang="en-US"/>
               <a:t>Fourth level</a:t>
             </a:r>
           </a:p>
           <a:p>
             <a:pPr lvl="4"/>
             <a:r>
-              <a:rPr lang="en-US" smtClean="0"/>
+              <a:rPr lang="en-US"/>
               <a:t>Fifth level</a:t>
             </a:r>
             <a:endParaRPr lang="en-US" dirty="0"/>
@@ -5924,35 +5927,35 @@
           <a:p>
             <a:pPr lvl="0"/>
             <a:r>
-              <a:rPr lang="en-US" smtClean="0"/>
+              <a:rPr lang="en-US"/>
               <a:t>Click to edit Master text styles</a:t>
             </a:r>
           </a:p>
           <a:p>
             <a:pPr lvl="1"/>
             <a:r>
-              <a:rPr lang="en-US" smtClean="0"/>
+              <a:rPr lang="en-US"/>
               <a:t>Second level</a:t>
             </a:r>
           </a:p>
           <a:p>
             <a:pPr lvl="2"/>
             <a:r>
-              <a:rPr lang="en-US" smtClean="0"/>
+              <a:rPr lang="en-US"/>
               <a:t>Third level</a:t>
             </a:r>
           </a:p>
           <a:p>
             <a:pPr lvl="3"/>
             <a:r>
-              <a:rPr lang="en-US" smtClean="0"/>
+              <a:rPr lang="en-US"/>
               <a:t>Fourth level</a:t>
             </a:r>
           </a:p>
           <a:p>
             <a:pPr lvl="4"/>
             <a:r>
-              <a:rPr lang="en-US" smtClean="0"/>
+              <a:rPr lang="en-US"/>
               <a:t>Fifth level</a:t>
             </a:r>
             <a:endParaRPr lang="en-US" dirty="0"/>
@@ -5977,7 +5980,7 @@
             <a:fld id="{1D8BD707-D9CF-40AE-B4C6-C98DA3205C09}" type="datetimeFigureOut">
               <a:rPr lang="en-US" smtClean="0"/>
               <a:pPr/>
-              <a:t>29/08/2022</a:t>
+              <a:t>9/7/2023</a:t>
             </a:fld>
             <a:endParaRPr lang="en-US"/>
           </a:p>
@@ -6071,10 +6074,9 @@
           </a:lstStyle>
           <a:p>
             <a:r>
-              <a:rPr lang="en-US" smtClean="0"/>
+              <a:rPr lang="en-US"/>
               <a:t>Click to edit Master title style</a:t>
             </a:r>
-            <a:endParaRPr lang="en-US"/>
           </a:p>
         </p:txBody>
       </p:sp>
@@ -6143,7 +6145,7 @@
           <a:p>
             <a:pPr lvl="0"/>
             <a:r>
-              <a:rPr lang="en-US" smtClean="0"/>
+              <a:rPr lang="en-US"/>
               <a:t>Click to edit Master text styles</a:t>
             </a:r>
           </a:p>
@@ -6199,35 +6201,35 @@
           <a:p>
             <a:pPr lvl="0"/>
             <a:r>
-              <a:rPr lang="en-US" smtClean="0"/>
+              <a:rPr lang="en-US"/>
               <a:t>Click to edit Master text styles</a:t>
             </a:r>
           </a:p>
           <a:p>
             <a:pPr lvl="1"/>
             <a:r>
-              <a:rPr lang="en-US" smtClean="0"/>
+              <a:rPr lang="en-US"/>
               <a:t>Second level</a:t>
             </a:r>
           </a:p>
           <a:p>
             <a:pPr lvl="2"/>
             <a:r>
-              <a:rPr lang="en-US" smtClean="0"/>
+              <a:rPr lang="en-US"/>
               <a:t>Third level</a:t>
             </a:r>
           </a:p>
           <a:p>
             <a:pPr lvl="3"/>
             <a:r>
-              <a:rPr lang="en-US" smtClean="0"/>
+              <a:rPr lang="en-US"/>
               <a:t>Fourth level</a:t>
             </a:r>
           </a:p>
           <a:p>
             <a:pPr lvl="4"/>
             <a:r>
-              <a:rPr lang="en-US" smtClean="0"/>
+              <a:rPr lang="en-US"/>
               <a:t>Fifth level</a:t>
             </a:r>
             <a:endParaRPr lang="en-US" dirty="0"/>
@@ -6299,7 +6301,7 @@
           <a:p>
             <a:pPr lvl="0"/>
             <a:r>
-              <a:rPr lang="en-US" smtClean="0"/>
+              <a:rPr lang="en-US"/>
               <a:t>Click to edit Master text styles</a:t>
             </a:r>
           </a:p>
@@ -6355,38 +6357,37 @@
           <a:p>
             <a:pPr lvl="0"/>
             <a:r>
-              <a:rPr lang="en-US" smtClean="0"/>
+              <a:rPr lang="en-US"/>
               <a:t>Click to edit Master text styles</a:t>
             </a:r>
           </a:p>
           <a:p>
             <a:pPr lvl="1"/>
             <a:r>
-              <a:rPr lang="en-US" smtClean="0"/>
+              <a:rPr lang="en-US"/>
               <a:t>Second level</a:t>
             </a:r>
           </a:p>
           <a:p>
             <a:pPr lvl="2"/>
             <a:r>
-              <a:rPr lang="en-US" smtClean="0"/>
+              <a:rPr lang="en-US"/>
               <a:t>Third level</a:t>
             </a:r>
           </a:p>
           <a:p>
             <a:pPr lvl="3"/>
             <a:r>
-              <a:rPr lang="en-US" smtClean="0"/>
+              <a:rPr lang="en-US"/>
               <a:t>Fourth level</a:t>
             </a:r>
           </a:p>
           <a:p>
             <a:pPr lvl="4"/>
             <a:r>
-              <a:rPr lang="en-US" smtClean="0"/>
+              <a:rPr lang="en-US"/>
               <a:t>Fifth level</a:t>
             </a:r>
-            <a:endParaRPr lang="en-US"/>
           </a:p>
         </p:txBody>
       </p:sp>
@@ -6408,7 +6409,7 @@
             <a:fld id="{1D8BD707-D9CF-40AE-B4C6-C98DA3205C09}" type="datetimeFigureOut">
               <a:rPr lang="en-US" smtClean="0"/>
               <a:pPr/>
-              <a:t>29/08/2022</a:t>
+              <a:t>9/7/2023</a:t>
             </a:fld>
             <a:endParaRPr lang="en-US"/>
           </a:p>
@@ -6498,10 +6499,9 @@
           <a:lstStyle/>
           <a:p>
             <a:r>
-              <a:rPr lang="en-US" smtClean="0"/>
+              <a:rPr lang="en-US"/>
               <a:t>Click to edit Master title style</a:t>
             </a:r>
-            <a:endParaRPr lang="en-US"/>
           </a:p>
         </p:txBody>
       </p:sp>
@@ -6523,7 +6523,7 @@
             <a:fld id="{1D8BD707-D9CF-40AE-B4C6-C98DA3205C09}" type="datetimeFigureOut">
               <a:rPr lang="en-US" smtClean="0"/>
               <a:pPr/>
-              <a:t>29/08/2022</a:t>
+              <a:t>9/7/2023</a:t>
             </a:fld>
             <a:endParaRPr lang="en-US"/>
           </a:p>
@@ -6615,7 +6615,7 @@
             <a:fld id="{1D8BD707-D9CF-40AE-B4C6-C98DA3205C09}" type="datetimeFigureOut">
               <a:rPr lang="en-US" smtClean="0"/>
               <a:pPr/>
-              <a:t>29/08/2022</a:t>
+              <a:t>9/7/2023</a:t>
             </a:fld>
             <a:endParaRPr lang="en-US"/>
           </a:p>
@@ -6714,7 +6714,7 @@
           </a:lstStyle>
           <a:p>
             <a:r>
-              <a:rPr lang="en-US" smtClean="0"/>
+              <a:rPr lang="en-US"/>
               <a:t>Click to edit Master title style</a:t>
             </a:r>
             <a:endParaRPr lang="en-US" dirty="0"/>
@@ -6782,7 +6782,7 @@
           <a:p>
             <a:pPr lvl="0"/>
             <a:r>
-              <a:rPr lang="en-US" smtClean="0"/>
+              <a:rPr lang="en-US"/>
               <a:t>Click to edit Master text styles</a:t>
             </a:r>
           </a:p>
@@ -6806,7 +6806,7 @@
             <a:fld id="{1D8BD707-D9CF-40AE-B4C6-C98DA3205C09}" type="datetimeFigureOut">
               <a:rPr lang="en-US" smtClean="0"/>
               <a:pPr/>
-              <a:t>29/08/2022</a:t>
+              <a:t>9/7/2023</a:t>
             </a:fld>
             <a:endParaRPr lang="en-US"/>
           </a:p>
@@ -6877,38 +6877,37 @@
           <a:p>
             <a:pPr lvl="0"/>
             <a:r>
-              <a:rPr lang="en-US" smtClean="0"/>
+              <a:rPr lang="en-US"/>
               <a:t>Click to edit Master text styles</a:t>
             </a:r>
           </a:p>
           <a:p>
             <a:pPr lvl="1"/>
             <a:r>
-              <a:rPr lang="en-US" smtClean="0"/>
+              <a:rPr lang="en-US"/>
               <a:t>Second level</a:t>
             </a:r>
           </a:p>
           <a:p>
             <a:pPr lvl="2"/>
             <a:r>
-              <a:rPr lang="en-US" smtClean="0"/>
+              <a:rPr lang="en-US"/>
               <a:t>Third level</a:t>
             </a:r>
           </a:p>
           <a:p>
             <a:pPr lvl="3"/>
             <a:r>
-              <a:rPr lang="en-US" smtClean="0"/>
+              <a:rPr lang="en-US"/>
               <a:t>Fourth level</a:t>
             </a:r>
           </a:p>
           <a:p>
             <a:pPr lvl="4"/>
             <a:r>
-              <a:rPr lang="en-US" smtClean="0"/>
+              <a:rPr lang="en-US"/>
               <a:t>Fifth level</a:t>
             </a:r>
-            <a:endParaRPr lang="en-US"/>
           </a:p>
         </p:txBody>
       </p:sp>
@@ -6969,7 +6968,7 @@
           </a:lstStyle>
           <a:p>
             <a:r>
-              <a:rPr lang="en-US" smtClean="0"/>
+              <a:rPr lang="en-US"/>
               <a:t>Click to edit Master title style</a:t>
             </a:r>
             <a:endParaRPr lang="en-US" dirty="0"/>
@@ -7034,7 +7033,7 @@
           </a:lstStyle>
           <a:p>
             <a:r>
-              <a:rPr lang="en-US" smtClean="0"/>
+              <a:rPr lang="en-US"/>
               <a:t>Click icon to add picture</a:t>
             </a:r>
             <a:endParaRPr lang="en-US" dirty="0"/>
@@ -7102,7 +7101,7 @@
           <a:p>
             <a:pPr lvl="0"/>
             <a:r>
-              <a:rPr lang="en-US" smtClean="0"/>
+              <a:rPr lang="en-US"/>
               <a:t>Click to edit Master text styles</a:t>
             </a:r>
           </a:p>
@@ -7126,7 +7125,7 @@
             <a:fld id="{1D8BD707-D9CF-40AE-B4C6-C98DA3205C09}" type="datetimeFigureOut">
               <a:rPr lang="en-US" smtClean="0"/>
               <a:pPr/>
-              <a:t>29/08/2022</a:t>
+              <a:t>9/7/2023</a:t>
             </a:fld>
             <a:endParaRPr lang="en-US"/>
           </a:p>
@@ -7231,7 +7230,7 @@
           <a:lstStyle/>
           <a:p>
             <a:r>
-              <a:rPr lang="en-US" smtClean="0"/>
+              <a:rPr lang="en-US"/>
               <a:t>Click to edit Master title style</a:t>
             </a:r>
             <a:endParaRPr lang="en-US" dirty="0"/>
@@ -7265,35 +7264,35 @@
           <a:p>
             <a:pPr lvl="0"/>
             <a:r>
-              <a:rPr lang="en-US" smtClean="0"/>
+              <a:rPr lang="en-US"/>
               <a:t>Click to edit Master text styles</a:t>
             </a:r>
           </a:p>
           <a:p>
             <a:pPr lvl="1"/>
             <a:r>
-              <a:rPr lang="en-US" smtClean="0"/>
+              <a:rPr lang="en-US"/>
               <a:t>Second level</a:t>
             </a:r>
           </a:p>
           <a:p>
             <a:pPr lvl="2"/>
             <a:r>
-              <a:rPr lang="en-US" smtClean="0"/>
+              <a:rPr lang="en-US"/>
               <a:t>Third level</a:t>
             </a:r>
           </a:p>
           <a:p>
             <a:pPr lvl="3"/>
             <a:r>
-              <a:rPr lang="en-US" smtClean="0"/>
+              <a:rPr lang="en-US"/>
               <a:t>Fourth level</a:t>
             </a:r>
           </a:p>
           <a:p>
             <a:pPr lvl="4"/>
             <a:r>
-              <a:rPr lang="en-US" smtClean="0"/>
+              <a:rPr lang="en-US"/>
               <a:t>Fifth level</a:t>
             </a:r>
             <a:endParaRPr lang="en-US" dirty="0"/>
@@ -7508,7 +7507,7 @@
             <a:fld id="{1D8BD707-D9CF-40AE-B4C6-C98DA3205C09}" type="datetimeFigureOut">
               <a:rPr lang="en-US" smtClean="0"/>
               <a:pPr/>
-              <a:t>29/08/2022</a:t>
+              <a:t>9/7/2023</a:t>
             </a:fld>
             <a:endParaRPr lang="en-US"/>
           </a:p>
@@ -7847,10 +7846,9 @@
           <a:lstStyle/>
           <a:p>
             <a:r>
-              <a:rPr lang="en-US" dirty="0" smtClean="0"/>
+              <a:rPr lang="en-US" dirty="0"/>
               <a:t>DBMS-UNIT 1</a:t>
             </a:r>
-            <a:endParaRPr lang="en-US" dirty="0"/>
           </a:p>
         </p:txBody>
       </p:sp>
@@ -7877,18 +7875,13 @@
           <a:lstStyle/>
           <a:p>
             <a:r>
-              <a:rPr lang="en-US" sz="4400" b="1" dirty="0" smtClean="0">
+              <a:rPr lang="en-US" sz="4400" b="1" dirty="0">
                 <a:solidFill>
                   <a:srgbClr val="0070C0"/>
                 </a:solidFill>
               </a:rPr>
               <a:t>Introduction</a:t>
             </a:r>
-            <a:endParaRPr lang="en-US" sz="4400" b="1" dirty="0">
-              <a:solidFill>
-                <a:srgbClr val="0070C0"/>
-              </a:solidFill>
-            </a:endParaRPr>
           </a:p>
         </p:txBody>
       </p:sp>
@@ -7902,13 +7895,6 @@
   <p:clrMapOvr>
     <a:masterClrMapping/>
   </p:clrMapOvr>
-  <p:timing>
-    <p:tnLst>
-      <p:par>
-        <p:cTn id="1" dur="indefinite" restart="never" nodeType="tmRoot"/>
-      </p:par>
-    </p:tnLst>
-  </p:timing>
 </p:sld>
 </file>
 
@@ -7996,7 +7982,7 @@
           <a:p>
             <a:pPr algn="just"/>
             <a:r>
-              <a:rPr lang="en-US" sz="2800" i="1" dirty="0" smtClean="0"/>
+              <a:rPr lang="en-US" sz="2800" i="1" dirty="0"/>
               <a:t> </a:t>
             </a:r>
             <a:r>
@@ -8009,42 +7995,14 @@
             </a:r>
             <a:r>
               <a:rPr lang="en-US" sz="2800" dirty="0"/>
-              <a:t>For reservations and schedule information. Airlines were among </a:t>
-            </a:r>
-            <a:r>
-              <a:rPr lang="en-US" sz="2800" dirty="0" smtClean="0"/>
-              <a:t>the first </a:t>
-            </a:r>
-            <a:r>
-              <a:rPr lang="en-US" sz="2800" dirty="0"/>
-              <a:t>to use databases in a geographically distributed manner—terminals </a:t>
-            </a:r>
-            <a:r>
-              <a:rPr lang="en-US" sz="2800" dirty="0" smtClean="0"/>
-              <a:t>situated around </a:t>
-            </a:r>
-            <a:r>
-              <a:rPr lang="en-US" sz="2800" dirty="0"/>
-              <a:t>the world accessed the central database system through </a:t>
-            </a:r>
-            <a:r>
-              <a:rPr lang="en-US" sz="2800" dirty="0" smtClean="0"/>
-              <a:t>phone lines </a:t>
-            </a:r>
-            <a:r>
-              <a:rPr lang="en-US" sz="2800" dirty="0"/>
-              <a:t>and other data networks.</a:t>
+              <a:t>For reservations and schedule information. Airlines were among the first to use databases in a geographically distributed manner—terminals situated around the world accessed the central database system through phone lines and other data networks.</a:t>
             </a:r>
           </a:p>
           <a:p>
             <a:pPr algn="just"/>
             <a:r>
-              <a:rPr lang="en-US" sz="2800" b="1" i="1" dirty="0" smtClean="0"/>
-              <a:t> </a:t>
-            </a:r>
-            <a:r>
               <a:rPr lang="en-US" sz="2800" b="1" i="1" dirty="0"/>
-              <a:t>Universities</a:t>
+              <a:t> Universities</a:t>
             </a:r>
             <a:r>
               <a:rPr lang="en-US" sz="2800" b="1" dirty="0"/>
@@ -8052,11 +8010,7 @@
             </a:r>
             <a:r>
               <a:rPr lang="en-US" sz="2800" dirty="0"/>
-              <a:t>For student information, course registrations, and grades</a:t>
-            </a:r>
-            <a:r>
-              <a:rPr lang="en-US" sz="2800" dirty="0" smtClean="0"/>
-              <a:t>.</a:t>
+              <a:t>For student information, course registrations, and grades.</a:t>
             </a:r>
           </a:p>
           <a:p>
@@ -8067,23 +8021,7 @@
             </a:r>
             <a:r>
               <a:rPr lang="en-US" sz="2800" dirty="0"/>
-              <a:t>: For keeping records of calls made, generating monthly </a:t>
-            </a:r>
-            <a:r>
-              <a:rPr lang="en-US" sz="2800" dirty="0" smtClean="0"/>
-              <a:t>bills, maintaining </a:t>
-            </a:r>
-            <a:r>
-              <a:rPr lang="en-US" sz="2800" dirty="0"/>
-              <a:t>balances on prepaid calling cards, and storing information </a:t>
-            </a:r>
-            <a:r>
-              <a:rPr lang="en-US" sz="2800" dirty="0" smtClean="0"/>
-              <a:t>about the </a:t>
-            </a:r>
-            <a:r>
-              <a:rPr lang="en-US" sz="2800" dirty="0"/>
-              <a:t>communication networks.</a:t>
+              <a:t>: For keeping records of calls made, generating monthly bills, maintaining balances on prepaid calling cards, and storing information about the communication networks.</a:t>
             </a:r>
           </a:p>
           <a:p>
@@ -8102,13 +8040,6 @@
   <p:clrMapOvr>
     <a:masterClrMapping/>
   </p:clrMapOvr>
-  <p:timing>
-    <p:tnLst>
-      <p:par>
-        <p:cTn id="1" dur="indefinite" restart="never" nodeType="tmRoot"/>
-      </p:par>
-    </p:tnLst>
-  </p:timing>
 </p:sld>
 </file>
 
@@ -8151,18 +8082,14 @@
           <a:p>
             <a:r>
               <a:rPr lang="en-US" b="1" dirty="0"/>
-              <a:t>Database System </a:t>
-            </a:r>
-            <a:r>
-              <a:rPr lang="en-US" b="1" dirty="0" smtClean="0"/>
-              <a:t>Applications </a:t>
-            </a:r>
-            <a:r>
-              <a:rPr lang="en-US" b="1" dirty="0" err="1" smtClean="0"/>
+              <a:t>Database System Applications </a:t>
+            </a:r>
+            <a:r>
+              <a:rPr lang="en-US" b="1" dirty="0" err="1"/>
               <a:t>cntd</a:t>
             </a:r>
             <a:r>
-              <a:rPr lang="en-US" b="1" dirty="0" smtClean="0"/>
+              <a:rPr lang="en-US" b="1" dirty="0"/>
               <a:t>..</a:t>
             </a:r>
             <a:endParaRPr lang="en-US" dirty="0"/>
@@ -8202,15 +8129,7 @@
             </a:r>
             <a:r>
               <a:rPr lang="en-US" sz="2800" dirty="0"/>
-              <a:t>For storing information about holdings, sales, and purchases of </a:t>
-            </a:r>
-            <a:r>
-              <a:rPr lang="en-US" sz="2800" dirty="0" smtClean="0"/>
-              <a:t>financial instruments </a:t>
-            </a:r>
-            <a:r>
-              <a:rPr lang="en-US" sz="2800" dirty="0"/>
-              <a:t>such as stocks and bonds.</a:t>
+              <a:t>For storing information about holdings, sales, and purchases of financial instruments such as stocks and bonds.</a:t>
             </a:r>
           </a:p>
           <a:p>
@@ -8244,15 +8163,7 @@
             </a:r>
             <a:r>
               <a:rPr lang="en-US" sz="2800" dirty="0"/>
-              <a:t>For management of supply chain and for tracking production of items in factories, inventories of items in warehouses/stores, and orders </a:t>
-            </a:r>
-            <a:r>
-              <a:rPr lang="en-US" sz="2800" dirty="0" smtClean="0"/>
-              <a:t>for items</a:t>
-            </a:r>
-            <a:r>
-              <a:rPr lang="en-US" sz="2800" dirty="0"/>
-              <a:t>.</a:t>
+              <a:t>For management of supply chain and for tracking production of items in factories, inventories of items in warehouses/stores, and orders for items.</a:t>
             </a:r>
           </a:p>
           <a:p>
@@ -8283,13 +8194,6 @@
   <p:clrMapOvr>
     <a:masterClrMapping/>
   </p:clrMapOvr>
-  <p:timing>
-    <p:tnLst>
-      <p:par>
-        <p:cTn id="1" dur="indefinite" restart="never" nodeType="tmRoot"/>
-      </p:par>
-    </p:tnLst>
-  </p:timing>
 </p:sld>
 </file>
 
@@ -8358,66 +8262,34 @@
             <a:pPr algn="just"/>
             <a:r>
               <a:rPr lang="en-US" sz="2800" dirty="0"/>
-              <a:t>For the system to be usable, it must retrieve data efficiently. The need for </a:t>
-            </a:r>
-            <a:r>
-              <a:rPr lang="en-US" sz="2800" dirty="0" smtClean="0"/>
-              <a:t>efficiency has </a:t>
-            </a:r>
+              <a:t>For the system to be usable, it must retrieve data efficiently. The need for efficiency has led designers to use complex data structures to represent data in the database.</a:t>
+            </a:r>
+          </a:p>
+          <a:p>
+            <a:pPr algn="just"/>
             <a:r>
               <a:rPr lang="en-US" sz="2800" dirty="0"/>
-              <a:t>led designers to use complex data structures to represent data in the database.</a:t>
+              <a:t>Since many database-systems users are not computer trained, developers hide the complexity from users through several levels of abstraction, to simplify users’ interactions with the system;</a:t>
             </a:r>
           </a:p>
           <a:p>
             <a:pPr algn="just"/>
             <a:r>
-              <a:rPr lang="en-US" sz="2800" dirty="0"/>
-              <a:t>Since many database-systems users are not computer trained, developers hide </a:t>
-            </a:r>
-            <a:r>
-              <a:rPr lang="en-US" sz="2800" dirty="0" smtClean="0"/>
-              <a:t>the complexity </a:t>
-            </a:r>
-            <a:r>
-              <a:rPr lang="en-US" sz="2800" dirty="0"/>
-              <a:t>from users through several levels of abstraction, to simplify users’ </a:t>
-            </a:r>
-            <a:r>
-              <a:rPr lang="en-US" sz="2800" dirty="0" smtClean="0"/>
-              <a:t>interactions with </a:t>
-            </a:r>
-            <a:r>
-              <a:rPr lang="en-US" sz="2800" dirty="0"/>
-              <a:t>the </a:t>
-            </a:r>
-            <a:r>
-              <a:rPr lang="en-US" sz="2800" dirty="0" smtClean="0"/>
-              <a:t>system;</a:t>
+              <a:rPr lang="en-US" sz="2800" b="1" dirty="0"/>
+              <a:t> Physical level</a:t>
             </a:r>
           </a:p>
           <a:p>
             <a:pPr algn="just"/>
             <a:r>
               <a:rPr lang="en-US" sz="2800" b="1" dirty="0"/>
-              <a:t> </a:t>
-            </a:r>
-            <a:r>
-              <a:rPr lang="en-US" sz="2800" b="1" dirty="0" smtClean="0"/>
-              <a:t>Physical level</a:t>
+              <a:t>Logical Level</a:t>
             </a:r>
           </a:p>
           <a:p>
             <a:pPr algn="just"/>
             <a:r>
-              <a:rPr lang="en-US" sz="2800" b="1" dirty="0" smtClean="0"/>
-              <a:t>Logical Level</a:t>
-            </a:r>
-          </a:p>
-          <a:p>
-            <a:pPr algn="just"/>
-            <a:r>
-              <a:rPr lang="en-US" sz="2800" b="1" dirty="0" smtClean="0"/>
+              <a:rPr lang="en-US" sz="2800" b="1" dirty="0"/>
               <a:t>View Level </a:t>
             </a:r>
           </a:p>
@@ -8437,13 +8309,6 @@
   <p:clrMapOvr>
     <a:masterClrMapping/>
   </p:clrMapOvr>
-  <p:timing>
-    <p:tnLst>
-      <p:par>
-        <p:cTn id="1" dur="indefinite" restart="never" nodeType="tmRoot"/>
-      </p:par>
-    </p:tnLst>
-  </p:timing>
 </p:sld>
 </file>
 
@@ -8538,13 +8403,6 @@
   <p:clrMapOvr>
     <a:masterClrMapping/>
   </p:clrMapOvr>
-  <p:timing>
-    <p:tnLst>
-      <p:par>
-        <p:cTn id="1" dur="indefinite" restart="never" nodeType="tmRoot"/>
-      </p:par>
-    </p:tnLst>
-  </p:timing>
 </p:sld>
 </file>
 
@@ -8602,19 +8460,7 @@
             </a:r>
             <a:r>
               <a:rPr lang="en-US" sz="2800" dirty="0"/>
-              <a:t>the data are </a:t>
-            </a:r>
-            <a:r>
-              <a:rPr lang="en-US" sz="2800" dirty="0" smtClean="0"/>
-              <a:t>actually stored</a:t>
-            </a:r>
-            <a:r>
-              <a:rPr lang="en-US" sz="2800" dirty="0"/>
-              <a:t>. The physical level describes complex low-level data structures </a:t>
-            </a:r>
-            <a:r>
-              <a:rPr lang="en-US" sz="2800" dirty="0" smtClean="0"/>
-              <a:t>in detail.</a:t>
+              <a:t>the data are actually stored. The physical level describes complex low-level data structures in detail.</a:t>
             </a:r>
           </a:p>
           <a:p>
@@ -8633,93 +8479,24 @@
             </a:r>
             <a:r>
               <a:rPr lang="en-US" sz="2800" dirty="0"/>
-              <a:t>data </a:t>
-            </a:r>
-            <a:r>
-              <a:rPr lang="en-US" sz="2800" dirty="0" smtClean="0"/>
-              <a:t>are stored </a:t>
-            </a:r>
+              <a:t>data are stored in the database, and what relationships exist among those data. </a:t>
+            </a:r>
+          </a:p>
+          <a:p>
+            <a:pPr algn="just"/>
             <a:r>
               <a:rPr lang="en-US" sz="2800" dirty="0"/>
-              <a:t>in the database, and what relationships exist among those data. </a:t>
-            </a:r>
-            <a:endParaRPr lang="en-US" sz="2800" dirty="0" smtClean="0"/>
-          </a:p>
-          <a:p>
-            <a:pPr algn="just"/>
-            <a:r>
-              <a:rPr lang="en-US" sz="2800" dirty="0" smtClean="0"/>
-              <a:t>Database administrators</a:t>
+              <a:t>Database administrators, who must decide what information to keep in the database, use the logical level of abstraction.</a:t>
+            </a:r>
+          </a:p>
+          <a:p>
+            <a:r>
+              <a:rPr lang="en-US" sz="2800" b="1" dirty="0"/>
+              <a:t>View level</a:t>
             </a:r>
             <a:r>
               <a:rPr lang="en-US" sz="2800" dirty="0"/>
-              <a:t>, who must decide </a:t>
-            </a:r>
-            <a:r>
-              <a:rPr lang="en-US" sz="2800" dirty="0" smtClean="0"/>
-              <a:t>what information </a:t>
-            </a:r>
-            <a:r>
-              <a:rPr lang="en-US" sz="2800" dirty="0"/>
-              <a:t>to keep in the </a:t>
-            </a:r>
-            <a:r>
-              <a:rPr lang="en-US" sz="2800" dirty="0" smtClean="0"/>
-              <a:t>database, use </a:t>
-            </a:r>
-            <a:r>
-              <a:rPr lang="en-US" sz="2800" dirty="0"/>
-              <a:t>the logical level of abstraction</a:t>
-            </a:r>
-            <a:r>
-              <a:rPr lang="en-US" sz="2800" dirty="0" smtClean="0"/>
-              <a:t>.</a:t>
-            </a:r>
-          </a:p>
-          <a:p>
-            <a:r>
-              <a:rPr lang="en-US" sz="2800" b="1" dirty="0" smtClean="0"/>
-              <a:t>View </a:t>
-            </a:r>
-            <a:r>
-              <a:rPr lang="en-US" sz="2800" b="1" dirty="0"/>
-              <a:t>level</a:t>
-            </a:r>
-            <a:r>
-              <a:rPr lang="en-US" sz="2800" dirty="0"/>
-              <a:t>. The highest level of abstraction describes only part of the </a:t>
-            </a:r>
-            <a:r>
-              <a:rPr lang="en-US" sz="2800" dirty="0" smtClean="0"/>
-              <a:t>entire database. </a:t>
-            </a:r>
-            <a:r>
-              <a:rPr lang="en-US" sz="2800" dirty="0"/>
-              <a:t>The view level of abstraction </a:t>
-            </a:r>
-            <a:r>
-              <a:rPr lang="en-US" sz="2800" dirty="0" smtClean="0"/>
-              <a:t>exists to </a:t>
-            </a:r>
-            <a:r>
-              <a:rPr lang="en-US" sz="2800" dirty="0"/>
-              <a:t>simplify </a:t>
-            </a:r>
-            <a:r>
-              <a:rPr lang="en-US" sz="2800" dirty="0" smtClean="0"/>
-              <a:t>users </a:t>
-            </a:r>
-            <a:r>
-              <a:rPr lang="en-US" sz="2800" dirty="0"/>
-              <a:t>interaction with the system. The system may provide </a:t>
-            </a:r>
-            <a:r>
-              <a:rPr lang="en-US" sz="2800" dirty="0" smtClean="0"/>
-              <a:t>many views </a:t>
-            </a:r>
-            <a:r>
-              <a:rPr lang="en-US" sz="2800" dirty="0"/>
-              <a:t>for the same database.</a:t>
+              <a:t>. The highest level of abstraction describes only part of the entire database. The view level of abstraction exists to simplify users interaction with the system. The system may provide many views for the same database.</a:t>
             </a:r>
           </a:p>
         </p:txBody>
@@ -8734,13 +8511,6 @@
   <p:clrMapOvr>
     <a:masterClrMapping/>
   </p:clrMapOvr>
-  <p:timing>
-    <p:tnLst>
-      <p:par>
-        <p:cTn id="1" dur="indefinite" restart="never" nodeType="tmRoot"/>
-      </p:par>
-    </p:tnLst>
-  </p:timing>
 </p:sld>
 </file>
 
@@ -8782,10 +8552,9 @@
           <a:lstStyle/>
           <a:p>
             <a:r>
-              <a:rPr lang="en-US" b="1" dirty="0" smtClean="0"/>
+              <a:rPr lang="en-US" b="1" dirty="0"/>
               <a:t>DBMS Terminologies</a:t>
             </a:r>
-            <a:endParaRPr lang="en-US" b="1" dirty="0"/>
           </a:p>
         </p:txBody>
       </p:sp>
@@ -8816,7 +8585,6 @@
               <a:rPr lang="en-US" sz="2500" b="1" u="sng" dirty="0"/>
               <a:t>Data Independence </a:t>
             </a:r>
-            <a:endParaRPr lang="en-US" sz="2500" b="1" u="sng" dirty="0" smtClean="0"/>
           </a:p>
           <a:p>
             <a:pPr marL="114300" indent="0" algn="just">
@@ -8827,27 +8595,15 @@
               <a:t> </a:t>
             </a:r>
             <a:r>
-              <a:rPr lang="en-US" sz="2500" dirty="0" smtClean="0"/>
-              <a:t>It is </a:t>
-            </a:r>
-            <a:r>
               <a:rPr lang="en-US" sz="2500" dirty="0"/>
-              <a:t>defined as a property of DBMS that helps you to change the Database schema at one level of a database system without requiring to change the schema at the next higher level. Data independence helps you to keep data separated from all programs that make use of it</a:t>
-            </a:r>
-            <a:r>
-              <a:rPr lang="en-US" sz="2500" dirty="0" smtClean="0"/>
-              <a:t>.</a:t>
+              <a:t>It is defined as a property of DBMS that helps you to change the Database schema at one level of a database system without requiring to change the schema at the next higher level. Data independence helps you to keep data separated from all programs that make use of it.</a:t>
             </a:r>
           </a:p>
           <a:p>
             <a:pPr algn="just"/>
             <a:r>
               <a:rPr lang="en-US" sz="2500" b="1" u="sng" dirty="0"/>
-              <a:t>Instance/database </a:t>
-            </a:r>
-            <a:r>
-              <a:rPr lang="en-US" sz="2500" b="1" u="sng" dirty="0" smtClean="0"/>
-              <a:t>state or snapshot</a:t>
+              <a:t>Instance/database state or snapshot</a:t>
             </a:r>
           </a:p>
           <a:p>
@@ -8856,23 +8612,7 @@
             </a:pPr>
             <a:r>
               <a:rPr lang="en-US" sz="2500" dirty="0"/>
-              <a:t>Databases change over time as information is inserted and deleted. The collection </a:t>
-            </a:r>
-            <a:r>
-              <a:rPr lang="en-US" sz="2500" dirty="0" smtClean="0"/>
-              <a:t>of information </a:t>
-            </a:r>
-            <a:r>
-              <a:rPr lang="en-US" sz="2500" dirty="0"/>
-              <a:t>stored in </a:t>
-            </a:r>
-            <a:r>
-              <a:rPr lang="en-US" sz="2500" dirty="0" smtClean="0"/>
-              <a:t>the database </a:t>
-            </a:r>
-            <a:r>
-              <a:rPr lang="en-US" sz="2500" dirty="0"/>
-              <a:t>at a particular moment is called an </a:t>
+              <a:t>Databases change over time as information is inserted and deleted. The collection of information stored in the database at a particular moment is called an </a:t>
             </a:r>
             <a:r>
               <a:rPr lang="en-US" sz="2500" b="1" dirty="0"/>
@@ -8880,16 +8620,12 @@
             </a:r>
             <a:r>
               <a:rPr lang="en-US" sz="2500" dirty="0"/>
-              <a:t>of </a:t>
-            </a:r>
-            <a:r>
-              <a:rPr lang="en-US" sz="2500" dirty="0" smtClean="0"/>
-              <a:t>the database.</a:t>
-            </a:r>
-          </a:p>
-          <a:p>
-            <a:r>
-              <a:rPr lang="en-US" sz="2500" b="1" u="sng" dirty="0" smtClean="0"/>
+              <a:t>of the database.</a:t>
+            </a:r>
+          </a:p>
+          <a:p>
+            <a:r>
+              <a:rPr lang="en-US" sz="2500" b="1" u="sng" dirty="0"/>
               <a:t>Schema</a:t>
             </a:r>
             <a:endParaRPr lang="en-US" sz="2500" u="sng" dirty="0"/>
@@ -8899,15 +8635,11 @@
               <a:buNone/>
             </a:pPr>
             <a:r>
-              <a:rPr lang="en-US" sz="2500" dirty="0" smtClean="0"/>
-              <a:t>The </a:t>
-            </a:r>
-            <a:r>
               <a:rPr lang="en-US" sz="2500" dirty="0"/>
-              <a:t>overall design of the database is called the database </a:t>
-            </a:r>
-            <a:r>
-              <a:rPr lang="en-US" sz="2500" b="1" dirty="0" smtClean="0"/>
+              <a:t>The overall design of the database is called the database </a:t>
+            </a:r>
+            <a:r>
+              <a:rPr lang="en-US" sz="2500" b="1" dirty="0"/>
               <a:t>schema.</a:t>
             </a:r>
             <a:endParaRPr lang="en-US" sz="2500" dirty="0"/>
@@ -8924,13 +8656,6 @@
   <p:clrMapOvr>
     <a:masterClrMapping/>
   </p:clrMapOvr>
-  <p:timing>
-    <p:tnLst>
-      <p:par>
-        <p:cTn id="1" dur="indefinite" restart="never" nodeType="tmRoot"/>
-      </p:par>
-    </p:tnLst>
-  </p:timing>
 </p:sld>
 </file>
 
@@ -9057,13 +8782,6 @@
   <p:clrMapOvr>
     <a:masterClrMapping/>
   </p:clrMapOvr>
-  <p:timing>
-    <p:tnLst>
-      <p:par>
-        <p:cTn id="1" dur="indefinite" restart="never" nodeType="tmRoot"/>
-      </p:par>
-    </p:tnLst>
-  </p:timing>
 </p:sld>
 </file>
 
@@ -9107,11 +8825,11 @@
           <a:lstStyle/>
           <a:p>
             <a:r>
-              <a:rPr lang="en-US" sz="2400" dirty="0" smtClean="0"/>
+              <a:rPr lang="en-US" sz="2400" dirty="0"/>
               <a:t>Sometimes  it may be referred as </a:t>
             </a:r>
             <a:r>
-              <a:rPr lang="en-US" sz="2400" b="1" dirty="0" smtClean="0">
+              <a:rPr lang="en-US" sz="2400" b="1" dirty="0">
                 <a:solidFill>
                   <a:srgbClr val="0070C0"/>
                 </a:solidFill>
@@ -9202,13 +8920,6 @@
   <p:clrMapOvr>
     <a:masterClrMapping/>
   </p:clrMapOvr>
-  <p:timing>
-    <p:tnLst>
-      <p:par>
-        <p:cTn id="1" dur="indefinite" restart="never" nodeType="tmRoot"/>
-      </p:par>
-    </p:tnLst>
-  </p:timing>
 </p:sld>
 </file>
 
@@ -9252,30 +8963,21 @@
           <a:lstStyle/>
           <a:p>
             <a:r>
-              <a:rPr lang="en-US" sz="2400" b="1" dirty="0" smtClean="0"/>
-              <a:t>Two-tier architecture</a:t>
-            </a:r>
-            <a:r>
               <a:rPr lang="en-US" sz="2400" b="1" dirty="0"/>
-              <a:t>:</a:t>
+              <a:t>Two-tier architecture:</a:t>
             </a:r>
             <a:r>
               <a:rPr lang="en-US" sz="2400" dirty="0"/>
               <a:t> </a:t>
             </a:r>
-            <a:endParaRPr lang="en-US" sz="2400" dirty="0" smtClean="0"/>
           </a:p>
           <a:p>
             <a:pPr marL="114300" indent="0" algn="just">
               <a:buNone/>
             </a:pPr>
             <a:r>
-              <a:rPr lang="en-US" sz="2400" dirty="0" smtClean="0"/>
-              <a:t>The </a:t>
-            </a:r>
-            <a:r>
               <a:rPr lang="en-US" sz="2400" dirty="0"/>
-              <a:t>two-tier architecture is similar to a basic </a:t>
+              <a:t>The two-tier architecture is similar to a basic </a:t>
             </a:r>
             <a:r>
               <a:rPr lang="en-US" sz="2400" b="1" dirty="0"/>
@@ -9369,13 +9071,6 @@
   <p:clrMapOvr>
     <a:masterClrMapping/>
   </p:clrMapOvr>
-  <p:timing>
-    <p:tnLst>
-      <p:par>
-        <p:cTn id="1" dur="indefinite" restart="never" nodeType="tmRoot"/>
-      </p:par>
-    </p:tnLst>
-  </p:timing>
 </p:sld>
 </file>
 
@@ -9419,12 +9114,8 @@
           <a:lstStyle/>
           <a:p>
             <a:r>
-              <a:rPr lang="en-US" sz="2600" b="1" dirty="0" smtClean="0"/>
-              <a:t>Three </a:t>
-            </a:r>
-            <a:r>
               <a:rPr lang="en-US" sz="2600" b="1" dirty="0"/>
-              <a:t>Tier architecture:</a:t>
+              <a:t>Three Tier architecture:</a:t>
             </a:r>
             <a:r>
               <a:rPr lang="en-US" sz="2600" dirty="0"/>
@@ -9434,14 +9125,9 @@
               <a:rPr lang="en-US" sz="2600" dirty="0"/>
             </a:br>
             <a:r>
-              <a:rPr lang="en-US" sz="2600" dirty="0" smtClean="0"/>
-              <a:t>In </a:t>
-            </a:r>
-            <a:r>
               <a:rPr lang="en-US" sz="2600" dirty="0"/>
-              <a:t>this type, there is another layer between the client and the server. The client does not directly communicate with the server. Instead, it interacts with an application server which further communicates with the database system and then the query processing and transaction management takes place. This intermediate layer acts as a medium for the exchange of partially processed data between server and client. This type of architecture is used in the case of large web applications. </a:t>
-            </a:r>
-            <a:endParaRPr lang="en-US" sz="2600" dirty="0" smtClean="0"/>
+              <a:t>In this type, there is another layer between the client and the server. The client does not directly communicate with the server. Instead, it interacts with an application server which further communicates with the database system and then the query processing and transaction management takes place. This intermediate layer acts as a medium for the exchange of partially processed data between server and client. This type of architecture is used in the case of large web applications. </a:t>
+            </a:r>
           </a:p>
           <a:p>
             <a:pPr fontAlgn="base"/>
@@ -9461,12 +9147,8 @@
               <a:t> </a:t>
             </a:r>
             <a:r>
-              <a:rPr lang="en-US" sz="2600" b="1" dirty="0" smtClean="0"/>
-              <a:t>Enhanced </a:t>
-            </a:r>
-            <a:r>
               <a:rPr lang="en-US" sz="2600" b="1" dirty="0"/>
-              <a:t>scalability</a:t>
+              <a:t>Enhanced scalability</a:t>
             </a:r>
             <a:r>
               <a:rPr lang="en-US" sz="2600" dirty="0"/>
@@ -9510,13 +9192,6 @@
   <p:clrMapOvr>
     <a:masterClrMapping/>
   </p:clrMapOvr>
-  <p:timing>
-    <p:tnLst>
-      <p:par>
-        <p:cTn id="1" dur="indefinite" restart="never" nodeType="tmRoot"/>
-      </p:par>
-    </p:tnLst>
-  </p:timing>
 </p:sld>
 </file>
 
@@ -9558,10 +9233,9 @@
           <a:lstStyle/>
           <a:p>
             <a:r>
-              <a:rPr lang="en-US" b="1" dirty="0" smtClean="0"/>
+              <a:rPr lang="en-US" b="1" dirty="0"/>
               <a:t>Database</a:t>
             </a:r>
-            <a:endParaRPr lang="en-US" b="1" dirty="0"/>
           </a:p>
         </p:txBody>
       </p:sp>
@@ -9589,7 +9263,7 @@
           <a:p>
             <a:pPr algn="just"/>
             <a:r>
-              <a:rPr lang="en-US" sz="2800" dirty="0" smtClean="0"/>
+              <a:rPr lang="en-US" sz="2800" dirty="0"/>
               <a:t>By </a:t>
             </a:r>
             <a:r>
@@ -9597,14 +9271,9 @@
               <a:t>data, </a:t>
             </a:r>
             <a:r>
-              <a:rPr lang="en-US" sz="2800" dirty="0" smtClean="0"/>
-              <a:t>it means </a:t>
-            </a:r>
-            <a:r>
               <a:rPr lang="en-US" sz="2800" dirty="0"/>
-              <a:t>known facts that can be recorded and that have implicit meaning. </a:t>
-            </a:r>
-            <a:endParaRPr lang="en-US" sz="2800" dirty="0" smtClean="0"/>
+              <a:t>it means known facts that can be recorded and that have implicit meaning. </a:t>
+            </a:r>
           </a:p>
           <a:p>
             <a:pPr algn="just"/>
@@ -9624,24 +9293,15 @@
           <a:p>
             <a:pPr algn="just"/>
             <a:r>
-              <a:rPr lang="en-US" sz="2800" dirty="0" smtClean="0"/>
-              <a:t>For </a:t>
-            </a:r>
-            <a:r>
               <a:rPr lang="en-US" sz="2800" dirty="0"/>
-              <a:t>example, consider the names, telephone numbers, and addresses of the people you know. You may have recorded this data in an indexed address book, or you may have stored it on a diskette, using a personal computer and software such as DBASE IV or V, Microsoft ACCESS, or EXCEL. </a:t>
-            </a:r>
-            <a:endParaRPr lang="en-US" sz="2800" dirty="0" smtClean="0"/>
+              <a:t>For example, consider the names, telephone numbers, and addresses of the people you know. You may have recorded this data in an indexed address book, or you may have stored it on a diskette, using a personal computer and software such as DBASE IV or V, Microsoft ACCESS, or EXCEL. </a:t>
+            </a:r>
           </a:p>
           <a:p>
             <a:pPr algn="just"/>
             <a:r>
-              <a:rPr lang="en-US" sz="2800" dirty="0" smtClean="0"/>
-              <a:t>This </a:t>
-            </a:r>
-            <a:r>
               <a:rPr lang="en-US" sz="2800" dirty="0"/>
-              <a:t>is a collection of related data with an implicit meaning and hence is a database.</a:t>
+              <a:t>This is a collection of related data with an implicit meaning and hence is a database.</a:t>
             </a:r>
           </a:p>
         </p:txBody>
@@ -9656,13 +9316,6 @@
   <p:clrMapOvr>
     <a:masterClrMapping/>
   </p:clrMapOvr>
-  <p:timing>
-    <p:tnLst>
-      <p:par>
-        <p:cTn id="1" dur="indefinite" restart="never" nodeType="tmRoot"/>
-      </p:par>
-    </p:tnLst>
-  </p:timing>
 </p:sld>
 </file>
 
@@ -9756,7 +9409,7 @@
           <a:p>
             <a:pPr algn="just"/>
             <a:r>
-              <a:rPr lang="en-US" sz="2400" i="1" dirty="0" smtClean="0"/>
+              <a:rPr lang="en-US" sz="2400" i="1" dirty="0"/>
               <a:t> </a:t>
             </a:r>
             <a:r>
@@ -9773,55 +9426,7 @@
             </a:r>
             <a:r>
               <a:rPr lang="en-US" sz="2400" dirty="0"/>
-              <a:t>systems, provide an </a:t>
-            </a:r>
-            <a:r>
-              <a:rPr lang="en-US" sz="2400" dirty="0" smtClean="0"/>
-              <a:t>interface to </a:t>
-            </a:r>
-            <a:r>
-              <a:rPr lang="en-US" sz="2400" dirty="0"/>
-              <a:t>which clients can send requests to perform an action, in </a:t>
-            </a:r>
-            <a:r>
-              <a:rPr lang="en-US" sz="2400" dirty="0" smtClean="0"/>
-              <a:t>response to </a:t>
-            </a:r>
-            <a:r>
-              <a:rPr lang="en-US" sz="2400" dirty="0"/>
-              <a:t>which they execute the action and send back results to the client. </a:t>
-            </a:r>
-            <a:r>
-              <a:rPr lang="en-US" sz="2400" dirty="0" smtClean="0"/>
-              <a:t>Usually, client </a:t>
-            </a:r>
-            <a:r>
-              <a:rPr lang="en-US" sz="2400" dirty="0"/>
-              <a:t>machines ship transactions to the server systems, where those </a:t>
-            </a:r>
-            <a:r>
-              <a:rPr lang="en-US" sz="2400" dirty="0" smtClean="0"/>
-              <a:t>transactions are </a:t>
-            </a:r>
-            <a:r>
-              <a:rPr lang="en-US" sz="2400" dirty="0"/>
-              <a:t>executed, and results are shipped back to clients that are in </a:t>
-            </a:r>
-            <a:r>
-              <a:rPr lang="en-US" sz="2400" dirty="0" smtClean="0"/>
-              <a:t>charge of </a:t>
-            </a:r>
-            <a:r>
-              <a:rPr lang="en-US" sz="2400" dirty="0"/>
-              <a:t>displaying the data. Requests may be specified by using SQL, or through </a:t>
-            </a:r>
-            <a:r>
-              <a:rPr lang="en-US" sz="2400" dirty="0" smtClean="0"/>
-              <a:t>a  specialized </a:t>
-            </a:r>
-            <a:r>
-              <a:rPr lang="en-US" sz="2400" dirty="0"/>
-              <a:t>application program interface.</a:t>
+              <a:t>systems, provide an interface to which clients can send requests to perform an action, in response to which they execute the action and send back results to the client. Usually, client machines ship transactions to the server systems, where those transactions are executed, and results are shipped back to clients that are in charge of displaying the data. Requests may be specified by using SQL, or through a  specialized application program interface.</a:t>
             </a:r>
           </a:p>
         </p:txBody>
@@ -9836,13 +9441,6 @@
   <p:clrMapOvr>
     <a:masterClrMapping/>
   </p:clrMapOvr>
-  <p:timing>
-    <p:tnLst>
-      <p:par>
-        <p:cTn id="1" dur="indefinite" restart="never" nodeType="tmRoot"/>
-      </p:par>
-    </p:tnLst>
-  </p:timing>
 </p:sld>
 </file>
 
@@ -9885,18 +9483,14 @@
           <a:p>
             <a:r>
               <a:rPr lang="en-US" b="1" dirty="0"/>
-              <a:t>Server System </a:t>
-            </a:r>
-            <a:r>
-              <a:rPr lang="en-US" b="1" dirty="0" smtClean="0"/>
-              <a:t>Architectures </a:t>
-            </a:r>
-            <a:r>
-              <a:rPr lang="en-US" b="1" dirty="0" err="1" smtClean="0"/>
+              <a:t>Server System Architectures </a:t>
+            </a:r>
+            <a:r>
+              <a:rPr lang="en-US" b="1" dirty="0" err="1"/>
               <a:t>cntd</a:t>
             </a:r>
             <a:r>
-              <a:rPr lang="en-US" b="1" dirty="0" smtClean="0"/>
+              <a:rPr lang="en-US" b="1" dirty="0"/>
               <a:t>..</a:t>
             </a:r>
             <a:endParaRPr lang="en-US" dirty="0"/>
@@ -9932,71 +9526,7 @@
             </a:r>
             <a:r>
               <a:rPr lang="en-US" sz="2800" dirty="0"/>
-              <a:t>allow clients to interact with the servers by making </a:t>
-            </a:r>
-            <a:r>
-              <a:rPr lang="en-US" sz="2800" dirty="0" smtClean="0"/>
-              <a:t>requests to </a:t>
-            </a:r>
-            <a:r>
-              <a:rPr lang="en-US" sz="2800" dirty="0"/>
-              <a:t>read or update data, in units such as files or pages. For </a:t>
-            </a:r>
-            <a:r>
-              <a:rPr lang="en-US" sz="2800" dirty="0" smtClean="0"/>
-              <a:t>example, file </a:t>
-            </a:r>
-            <a:r>
-              <a:rPr lang="en-US" sz="2800" dirty="0"/>
-              <a:t>servers provide a file-system interface where clients can create, </a:t>
-            </a:r>
-            <a:r>
-              <a:rPr lang="en-US" sz="2800" dirty="0" smtClean="0"/>
-              <a:t>update, read</a:t>
-            </a:r>
-            <a:r>
-              <a:rPr lang="en-US" sz="2800" dirty="0"/>
-              <a:t>, and delete files. Data servers for database systems </a:t>
-            </a:r>
-            <a:r>
-              <a:rPr lang="en-US" sz="2800" dirty="0" smtClean="0"/>
-              <a:t>offer much </a:t>
-            </a:r>
-            <a:r>
-              <a:rPr lang="en-US" sz="2800" dirty="0"/>
-              <a:t>more </a:t>
-            </a:r>
-            <a:r>
-              <a:rPr lang="en-US" sz="2800" dirty="0" smtClean="0"/>
-              <a:t>functionality; they </a:t>
-            </a:r>
-            <a:r>
-              <a:rPr lang="en-US" sz="2800" dirty="0"/>
-              <a:t>support units of data—such as pages, tuples, or </a:t>
-            </a:r>
-            <a:r>
-              <a:rPr lang="en-US" sz="2800" dirty="0" smtClean="0"/>
-              <a:t>objects—that are </a:t>
-            </a:r>
-            <a:r>
-              <a:rPr lang="en-US" sz="2800" dirty="0"/>
-              <a:t>smaller than a file. They provide indexing facilities for data, and </a:t>
-            </a:r>
-            <a:r>
-              <a:rPr lang="en-US" sz="2800" dirty="0" smtClean="0"/>
-              <a:t>provide transaction </a:t>
-            </a:r>
-            <a:r>
-              <a:rPr lang="en-US" sz="2800" dirty="0"/>
-              <a:t>facilities so that the data are never left in an inconsistent state if </a:t>
-            </a:r>
-            <a:r>
-              <a:rPr lang="en-US" sz="2800" dirty="0" smtClean="0"/>
-              <a:t>a client </a:t>
-            </a:r>
-            <a:r>
-              <a:rPr lang="en-US" sz="2800" dirty="0"/>
-              <a:t>machine or process fails.</a:t>
+              <a:t>allow clients to interact with the servers by making requests to read or update data, in units such as files or pages. For example, file servers provide a file-system interface where clients can create, update, read, and delete files. Data servers for database systems offer much more functionality; they support units of data—such as pages, tuples, or objects—that are smaller than a file. They provide indexing facilities for data, and provide transaction facilities so that the data are never left in an inconsistent state if a client machine or process fails.</a:t>
             </a:r>
           </a:p>
         </p:txBody>
@@ -10011,13 +9541,6 @@
   <p:clrMapOvr>
     <a:masterClrMapping/>
   </p:clrMapOvr>
-  <p:timing>
-    <p:tnLst>
-      <p:par>
-        <p:cTn id="1" dur="indefinite" restart="never" nodeType="tmRoot"/>
-      </p:par>
-    </p:tnLst>
-  </p:timing>
 </p:sld>
 </file>
 
@@ -10084,11 +9607,7 @@
           <a:p>
             <a:r>
               <a:rPr lang="en-US" sz="2400" dirty="0"/>
-              <a:t>Several criteria can be used to classify </a:t>
-            </a:r>
-            <a:r>
-              <a:rPr lang="en-US" sz="2400" dirty="0" smtClean="0"/>
-              <a:t>DBMS.</a:t>
+              <a:t>Several criteria can be used to classify DBMS.</a:t>
             </a:r>
           </a:p>
           <a:p>
@@ -10098,20 +9617,8 @@
               </a:lnSpc>
             </a:pPr>
             <a:r>
-              <a:rPr lang="en-US" sz="2400" b="1" dirty="0" smtClean="0"/>
-              <a:t>Classification </a:t>
-            </a:r>
-            <a:r>
               <a:rPr lang="en-US" sz="2400" b="1" dirty="0"/>
-              <a:t>Based on Data </a:t>
-            </a:r>
-            <a:r>
-              <a:rPr lang="en-US" sz="2400" b="1" dirty="0" smtClean="0"/>
-              <a:t>Model         Relational data </a:t>
-            </a:r>
-            <a:r>
-              <a:rPr lang="en-US" sz="2400" b="1" dirty="0"/>
-              <a:t>model</a:t>
+              <a:t>Classification Based on Data Model         Relational data model</a:t>
             </a:r>
           </a:p>
           <a:p>
@@ -10122,7 +9629,7 @@
               <a:buNone/>
             </a:pPr>
             <a:r>
-              <a:rPr lang="en-US" sz="2400" b="1" dirty="0" smtClean="0"/>
+              <a:rPr lang="en-US" sz="2400" b="1" dirty="0"/>
               <a:t>                                                                                    Object Oriented data model</a:t>
             </a:r>
           </a:p>
@@ -10133,7 +9640,7 @@
               </a:lnSpc>
             </a:pPr>
             <a:r>
-              <a:rPr lang="en-US" sz="2400" b="1" dirty="0" smtClean="0"/>
+              <a:rPr lang="en-US" sz="2400" b="1" dirty="0"/>
               <a:t>Classification Based on User Numbers          Single user system</a:t>
             </a:r>
           </a:p>
@@ -10144,7 +9651,7 @@
               </a:lnSpc>
             </a:pPr>
             <a:r>
-              <a:rPr lang="en-US" sz="2400" b="1" dirty="0" smtClean="0"/>
+              <a:rPr lang="en-US" sz="2400" b="1" dirty="0"/>
               <a:t>                                                                            Multi User  system</a:t>
             </a:r>
           </a:p>
@@ -10156,23 +9663,15 @@
             </a:pPr>
             <a:r>
               <a:rPr lang="en-US" sz="2400" b="1" dirty="0"/>
-              <a:t>C</a:t>
-            </a:r>
-            <a:r>
-              <a:rPr lang="en-US" sz="2400" b="1" dirty="0" smtClean="0"/>
-              <a:t>lassification </a:t>
-            </a:r>
+              <a:t>Classification Based on Database Distribution</a:t>
+            </a:r>
+          </a:p>
+          <a:p>
+            <a:endParaRPr lang="en-US" sz="2400" dirty="0"/>
+          </a:p>
+          <a:p>
             <a:r>
               <a:rPr lang="en-US" sz="2400" b="1" dirty="0"/>
-              <a:t>Based on Database Distribution</a:t>
-            </a:r>
-          </a:p>
-          <a:p>
-            <a:endParaRPr lang="en-US" sz="2400" dirty="0" smtClean="0"/>
-          </a:p>
-          <a:p>
-            <a:r>
-              <a:rPr lang="en-US" sz="2400" b="1" dirty="0" smtClean="0"/>
               <a:t>Centralized          Distributed            Homogeneous</a:t>
             </a:r>
           </a:p>
@@ -10181,10 +9680,9 @@
               <a:buNone/>
             </a:pPr>
             <a:r>
-              <a:rPr lang="en-US" sz="2400" b="1" dirty="0" smtClean="0"/>
+              <a:rPr lang="en-US" sz="2400" b="1" dirty="0"/>
               <a:t>                                                                   Heterogeneous</a:t>
             </a:r>
-            <a:endParaRPr lang="en-US" sz="2400" b="1" dirty="0"/>
           </a:p>
         </p:txBody>
       </p:sp>
@@ -10514,13 +10012,6 @@
   <p:clrMapOvr>
     <a:masterClrMapping/>
   </p:clrMapOvr>
-  <p:timing>
-    <p:tnLst>
-      <p:par>
-        <p:cTn id="1" dur="indefinite" restart="never" nodeType="tmRoot"/>
-      </p:par>
-    </p:tnLst>
-  </p:timing>
 </p:sld>
 </file>
 
@@ -10692,10 +10183,9 @@
           <a:lstStyle/>
           <a:p>
             <a:r>
-              <a:rPr lang="en-US" sz="2400" b="1" dirty="0" smtClean="0"/>
+              <a:rPr lang="en-US" sz="2400" b="1" dirty="0"/>
               <a:t>Single User system</a:t>
             </a:r>
-            <a:endParaRPr lang="en-US" sz="2400" b="1" dirty="0"/>
           </a:p>
         </p:txBody>
       </p:sp>
@@ -10722,10 +10212,9 @@
           <a:lstStyle/>
           <a:p>
             <a:r>
-              <a:rPr lang="en-US" sz="2400" b="1" dirty="0" smtClean="0"/>
+              <a:rPr lang="en-US" sz="2400" b="1" dirty="0"/>
               <a:t>Multi User system</a:t>
             </a:r>
-            <a:endParaRPr lang="en-US" sz="2400" b="1" dirty="0"/>
           </a:p>
         </p:txBody>
       </p:sp>
@@ -10739,21 +10228,6 @@
   <p:clrMapOvr>
     <a:masterClrMapping/>
   </p:clrMapOvr>
-  <mc:AlternateContent xmlns:mc="http://schemas.openxmlformats.org/markup-compatibility/2006" xmlns:p14="http://schemas.microsoft.com/office/powerpoint/2010/main">
-    <mc:Choice Requires="p14">
-      <p:transition spd="slow" p14:dur="2000"/>
-    </mc:Choice>
-    <mc:Fallback xmlns="">
-      <p:transition spd="slow"/>
-    </mc:Fallback>
-  </mc:AlternateContent>
-  <p:timing>
-    <p:tnLst>
-      <p:par>
-        <p:cTn id="1" dur="indefinite" restart="never" nodeType="tmRoot"/>
-      </p:par>
-    </p:tnLst>
-  </p:timing>
 </p:sld>
 </file>
 
@@ -10836,10 +10310,9 @@
           <a:lstStyle/>
           <a:p>
             <a:r>
-              <a:rPr lang="en-US" b="1" dirty="0" smtClean="0"/>
+              <a:rPr lang="en-US" b="1" dirty="0"/>
               <a:t>Centralized System</a:t>
             </a:r>
-            <a:endParaRPr lang="en-US" b="1" dirty="0"/>
           </a:p>
         </p:txBody>
       </p:sp>
@@ -10901,10 +10374,9 @@
           <a:lstStyle/>
           <a:p>
             <a:r>
-              <a:rPr lang="en-US" b="1" dirty="0" smtClean="0"/>
+              <a:rPr lang="en-US" b="1" dirty="0"/>
               <a:t>Distributed  System</a:t>
             </a:r>
-            <a:endParaRPr lang="en-US" b="1" dirty="0"/>
           </a:p>
         </p:txBody>
       </p:sp>
@@ -10918,13 +10390,6 @@
   <p:clrMapOvr>
     <a:masterClrMapping/>
   </p:clrMapOvr>
-  <p:timing>
-    <p:tnLst>
-      <p:par>
-        <p:cTn id="1" dur="indefinite" restart="never" nodeType="tmRoot"/>
-      </p:par>
-    </p:tnLst>
-  </p:timing>
 </p:sld>
 </file>
 
@@ -10963,10 +10428,6 @@
             <a:r>
               <a:rPr lang="en-US" dirty="0"/>
               <a:t>Why is Database Design important?</a:t>
-            </a:r>
-            <a:r>
-              <a:rPr lang="en-US" b="1" dirty="0"/>
-              <a:t/>
             </a:r>
             <a:br>
               <a:rPr lang="en-US" b="1" dirty="0"/>
@@ -11022,21 +10483,6 @@
   <p:clrMapOvr>
     <a:masterClrMapping/>
   </p:clrMapOvr>
-  <mc:AlternateContent xmlns:mc="http://schemas.openxmlformats.org/markup-compatibility/2006" xmlns:p14="http://schemas.microsoft.com/office/powerpoint/2010/main">
-    <mc:Choice Requires="p14">
-      <p:transition spd="slow" p14:dur="2000"/>
-    </mc:Choice>
-    <mc:Fallback xmlns="">
-      <p:transition spd="slow"/>
-    </mc:Fallback>
-  </mc:AlternateContent>
-  <p:timing>
-    <p:tnLst>
-      <p:par>
-        <p:cTn id="1" dur="indefinite" restart="never" nodeType="tmRoot"/>
-      </p:par>
-    </p:tnLst>
-  </p:timing>
 </p:sld>
 </file>
 
@@ -11154,26 +10600,21 @@
             </a:r>
           </a:p>
           <a:p>
-            <a:endParaRPr lang="en-US" sz="2800" b="1" dirty="0" smtClean="0"/>
-          </a:p>
-          <a:p>
-            <a:r>
-              <a:rPr lang="en-US" sz="2800" b="1" dirty="0" smtClean="0"/>
-              <a:t>Phase </a:t>
-            </a:r>
+            <a:endParaRPr lang="en-US" sz="2800" b="1" dirty="0"/>
+          </a:p>
+          <a:p>
             <a:r>
               <a:rPr lang="en-US" sz="2800" b="1" dirty="0"/>
-              <a:t>1: </a:t>
+              <a:t>Phase 1: </a:t>
             </a:r>
             <a:r>
               <a:rPr lang="en-US" sz="2800" dirty="0"/>
               <a:t>Requirements Collection and Analysis </a:t>
             </a:r>
-            <a:endParaRPr lang="en-US" sz="2800" dirty="0" smtClean="0"/>
-          </a:p>
-          <a:p>
-            <a:r>
-              <a:rPr lang="en-US" sz="2800" dirty="0" smtClean="0"/>
+          </a:p>
+          <a:p>
+            <a:r>
+              <a:rPr lang="en-US" sz="2800" dirty="0"/>
               <a:t> </a:t>
             </a:r>
             <a:r>
@@ -11184,11 +10625,10 @@
               <a:rPr lang="en-US" sz="2800" dirty="0"/>
               <a:t>Conceptual Database Design </a:t>
             </a:r>
-            <a:endParaRPr lang="en-US" sz="2800" dirty="0" smtClean="0"/>
-          </a:p>
-          <a:p>
-            <a:r>
-              <a:rPr lang="en-US" sz="2800" dirty="0" smtClean="0"/>
+          </a:p>
+          <a:p>
+            <a:r>
+              <a:rPr lang="en-US" sz="2800" dirty="0"/>
               <a:t> </a:t>
             </a:r>
             <a:r>
@@ -11199,11 +10639,10 @@
               <a:rPr lang="en-US" sz="2800" dirty="0"/>
               <a:t>Choice of a DBMS </a:t>
             </a:r>
-            <a:endParaRPr lang="en-US" sz="2800" dirty="0" smtClean="0"/>
-          </a:p>
-          <a:p>
-            <a:r>
-              <a:rPr lang="en-US" sz="2800" dirty="0" smtClean="0"/>
+          </a:p>
+          <a:p>
+            <a:r>
+              <a:rPr lang="en-US" sz="2800" dirty="0"/>
               <a:t> </a:t>
             </a:r>
             <a:r>
@@ -11212,31 +10651,22 @@
             </a:r>
             <a:r>
               <a:rPr lang="en-US" sz="2800" dirty="0"/>
-              <a:t>Data Model Mapping (Logical Database </a:t>
-            </a:r>
-            <a:r>
-              <a:rPr lang="en-US" sz="2800" dirty="0" smtClean="0"/>
-              <a:t>Design)</a:t>
-            </a:r>
-          </a:p>
-          <a:p>
-            <a:r>
-              <a:rPr lang="en-US" sz="2800" b="1" dirty="0" smtClean="0"/>
-              <a:t>Phase </a:t>
-            </a:r>
+              <a:t>Data Model Mapping (Logical Database Design)</a:t>
+            </a:r>
+          </a:p>
+          <a:p>
             <a:r>
               <a:rPr lang="en-US" sz="2800" b="1" dirty="0"/>
-              <a:t>5: </a:t>
+              <a:t>Phase 5: </a:t>
             </a:r>
             <a:r>
               <a:rPr lang="en-US" sz="2800" dirty="0"/>
               <a:t>Physical Database Design </a:t>
             </a:r>
-            <a:endParaRPr lang="en-US" sz="2800" dirty="0" smtClean="0"/>
-          </a:p>
-          <a:p>
-            <a:r>
-              <a:rPr lang="en-US" sz="2800" dirty="0" smtClean="0"/>
+          </a:p>
+          <a:p>
+            <a:r>
+              <a:rPr lang="en-US" sz="2800" dirty="0"/>
               <a:t> </a:t>
             </a:r>
             <a:r>
@@ -11260,13 +10690,6 @@
   <p:clrMapOvr>
     <a:masterClrMapping/>
   </p:clrMapOvr>
-  <p:timing>
-    <p:tnLst>
-      <p:par>
-        <p:cTn id="1" dur="indefinite" restart="never" nodeType="tmRoot"/>
-      </p:par>
-    </p:tnLst>
-  </p:timing>
 </p:sld>
 </file>
 
@@ -11368,13 +10791,6 @@
   <p:clrMapOvr>
     <a:masterClrMapping/>
   </p:clrMapOvr>
-  <p:timing>
-    <p:tnLst>
-      <p:par>
-        <p:cTn id="1" dur="indefinite" restart="never" nodeType="tmRoot"/>
-      </p:par>
-    </p:tnLst>
-  </p:timing>
 </p:sld>
 </file>
 
@@ -11445,15 +10861,7 @@
           <a:p>
             <a:r>
               <a:rPr lang="en-US" sz="3600" b="1" dirty="0"/>
-              <a:t>Phases of Database Design </a:t>
-            </a:r>
-            <a:r>
-              <a:rPr lang="en-US" sz="3600" b="1" dirty="0" smtClean="0"/>
-              <a:t>(</a:t>
-            </a:r>
-            <a:r>
-              <a:rPr lang="en-US" sz="3600" b="1" dirty="0"/>
-              <a:t>contd.)</a:t>
+              <a:t>Phases of Database Design (contd.)</a:t>
             </a:r>
           </a:p>
         </p:txBody>
@@ -11491,23 +10899,7 @@
                   <a:srgbClr val="7030A0"/>
                 </a:solidFill>
               </a:rPr>
-              <a:t>Requirements  Collections </a:t>
-            </a:r>
-            <a:r>
-              <a:rPr lang="en-US" sz="3200" b="1" dirty="0" smtClean="0">
-                <a:solidFill>
-                  <a:srgbClr val="7030A0"/>
-                </a:solidFill>
-              </a:rPr>
-              <a:t> and </a:t>
-            </a:r>
-            <a:r>
-              <a:rPr lang="en-US" sz="3200" b="1" dirty="0">
-                <a:solidFill>
-                  <a:srgbClr val="7030A0"/>
-                </a:solidFill>
-              </a:rPr>
-              <a:t>Analysis</a:t>
+              <a:t>Requirements  Collections  and Analysis</a:t>
             </a:r>
           </a:p>
           <a:p>
@@ -11550,20 +10942,12 @@
               </a:lnSpc>
             </a:pPr>
             <a:r>
-              <a:rPr lang="en-US" sz="3200" b="1" dirty="0" smtClean="0">
+              <a:rPr lang="en-US" sz="3200" b="1" dirty="0">
                 <a:solidFill>
                   <a:srgbClr val="7030A0"/>
                 </a:solidFill>
               </a:rPr>
-              <a:t>Conceptual </a:t>
-            </a:r>
-            <a:r>
-              <a:rPr lang="en-US" sz="3200" b="1" dirty="0">
-                <a:solidFill>
-                  <a:srgbClr val="7030A0"/>
-                </a:solidFill>
-              </a:rPr>
-              <a:t>Database Design</a:t>
+              <a:t>Conceptual Database Design</a:t>
             </a:r>
           </a:p>
           <a:p>
@@ -11630,21 +11014,6 @@
   <p:clrMapOvr>
     <a:masterClrMapping/>
   </p:clrMapOvr>
-  <mc:AlternateContent xmlns:mc="http://schemas.openxmlformats.org/markup-compatibility/2006" xmlns:p14="http://schemas.microsoft.com/office/powerpoint/2010/main">
-    <mc:Choice Requires="p14">
-      <p:transition spd="slow" p14:dur="2000"/>
-    </mc:Choice>
-    <mc:Fallback xmlns="">
-      <p:transition spd="slow"/>
-    </mc:Fallback>
-  </mc:AlternateContent>
-  <p:timing>
-    <p:tnLst>
-      <p:par>
-        <p:cTn id="1" dur="indefinite" restart="never" nodeType="tmRoot"/>
-      </p:par>
-    </p:tnLst>
-  </p:timing>
 </p:sld>
 </file>
 
@@ -11791,11 +11160,7 @@
             </a:pPr>
             <a:r>
               <a:rPr lang="en-US" sz="2800" dirty="0"/>
-              <a:t>Time consuming, places the burden on DBA to reconcile </a:t>
-            </a:r>
-            <a:r>
-              <a:rPr lang="en-US" sz="2800" dirty="0" smtClean="0"/>
-              <a:t>conflicts</a:t>
+              <a:t>Time consuming, places the burden on DBA to reconcile conflicts</a:t>
             </a:r>
           </a:p>
           <a:p>
@@ -11862,21 +11227,6 @@
   <p:clrMapOvr>
     <a:masterClrMapping/>
   </p:clrMapOvr>
-  <mc:AlternateContent xmlns:mc="http://schemas.openxmlformats.org/markup-compatibility/2006" xmlns:p14="http://schemas.microsoft.com/office/powerpoint/2010/main">
-    <mc:Choice Requires="p14">
-      <p:transition spd="slow" p14:dur="2000"/>
-    </mc:Choice>
-    <mc:Fallback xmlns="">
-      <p:transition spd="slow"/>
-    </mc:Fallback>
-  </mc:AlternateContent>
-  <p:timing>
-    <p:tnLst>
-      <p:par>
-        <p:cTn id="1" dur="indefinite" restart="never" nodeType="tmRoot"/>
-      </p:par>
-    </p:tnLst>
-  </p:timing>
 </p:sld>
 </file>
 
@@ -11913,12 +11263,8 @@
           <a:lstStyle/>
           <a:p>
             <a:r>
-              <a:rPr lang="en-US" sz="4800" b="1" dirty="0" smtClean="0"/>
-              <a:t>Database </a:t>
-            </a:r>
-            <a:r>
               <a:rPr lang="en-US" sz="4800" b="1" dirty="0"/>
-              <a:t>management system</a:t>
+              <a:t>Database management system</a:t>
             </a:r>
             <a:endParaRPr lang="en-US" dirty="0"/>
           </a:p>
@@ -12051,13 +11397,6 @@
   <p:clrMapOvr>
     <a:masterClrMapping/>
   </p:clrMapOvr>
-  <p:timing>
-    <p:tnLst>
-      <p:par>
-        <p:cTn id="1" dur="indefinite" restart="never" nodeType="tmRoot"/>
-      </p:par>
-    </p:tnLst>
-  </p:timing>
 </p:sld>
 </file>
 
@@ -12215,21 +11554,6 @@
   <p:clrMapOvr>
     <a:masterClrMapping/>
   </p:clrMapOvr>
-  <mc:AlternateContent xmlns:mc="http://schemas.openxmlformats.org/markup-compatibility/2006" xmlns:p14="http://schemas.microsoft.com/office/powerpoint/2010/main">
-    <mc:Choice Requires="p14">
-      <p:transition spd="slow" p14:dur="2000"/>
-    </mc:Choice>
-    <mc:Fallback xmlns="">
-      <p:transition spd="slow"/>
-    </mc:Fallback>
-  </mc:AlternateContent>
-  <p:timing>
-    <p:tnLst>
-      <p:par>
-        <p:cTn id="1" dur="indefinite" restart="never" nodeType="tmRoot"/>
-      </p:par>
-    </p:tnLst>
-  </p:timing>
 </p:sld>
 </file>
 
@@ -12396,21 +11720,6 @@
   <p:clrMapOvr>
     <a:masterClrMapping/>
   </p:clrMapOvr>
-  <mc:AlternateContent xmlns:mc="http://schemas.openxmlformats.org/markup-compatibility/2006" xmlns:p14="http://schemas.microsoft.com/office/powerpoint/2010/main">
-    <mc:Choice Requires="p14">
-      <p:transition spd="slow" p14:dur="2000"/>
-    </mc:Choice>
-    <mc:Fallback xmlns="">
-      <p:transition spd="slow"/>
-    </mc:Fallback>
-  </mc:AlternateContent>
-  <p:timing>
-    <p:tnLst>
-      <p:par>
-        <p:cTn id="1" dur="indefinite" restart="never" nodeType="tmRoot"/>
-      </p:par>
-    </p:tnLst>
-  </p:timing>
 </p:sld>
 </file>
 
@@ -12542,21 +11851,6 @@
   <p:clrMapOvr>
     <a:masterClrMapping/>
   </p:clrMapOvr>
-  <mc:AlternateContent xmlns:mc="http://schemas.openxmlformats.org/markup-compatibility/2006" xmlns:p14="http://schemas.microsoft.com/office/powerpoint/2010/main">
-    <mc:Choice Requires="p14">
-      <p:transition spd="slow" p14:dur="2000"/>
-    </mc:Choice>
-    <mc:Fallback xmlns="">
-      <p:transition spd="slow"/>
-    </mc:Fallback>
-  </mc:AlternateContent>
-  <p:timing>
-    <p:tnLst>
-      <p:par>
-        <p:cTn id="1" dur="indefinite" restart="never" nodeType="tmRoot"/>
-      </p:par>
-    </p:tnLst>
-  </p:timing>
 </p:sld>
 </file>
 
@@ -12662,11 +11956,7 @@
             </a:pPr>
             <a:r>
               <a:rPr lang="en-US" sz="2800" dirty="0"/>
-              <a:t>Many factors to </a:t>
-            </a:r>
-            <a:r>
-              <a:rPr lang="en-US" sz="2800" dirty="0" smtClean="0"/>
-              <a:t>consider for </a:t>
+              <a:t>Many factors to consider for </a:t>
             </a:r>
             <a:r>
               <a:rPr lang="en-US" sz="2800" b="1" i="1" dirty="0">
@@ -12674,37 +11964,8 @@
                   <a:srgbClr val="7030A0"/>
                 </a:solidFill>
               </a:rPr>
-              <a:t>Choice of </a:t>
-            </a:r>
-            <a:r>
-              <a:rPr lang="en-US" sz="2800" b="1" i="1" dirty="0" smtClean="0">
-                <a:solidFill>
-                  <a:srgbClr val="7030A0"/>
-                </a:solidFill>
-              </a:rPr>
-              <a:t>DBMS</a:t>
-            </a:r>
-            <a:r>
-              <a:rPr lang="en-US" sz="2800" b="1" i="1" dirty="0">
-                <a:solidFill>
-                  <a:srgbClr val="7030A0"/>
-                </a:solidFill>
-              </a:rPr>
-              <a:t>(Phase </a:t>
-            </a:r>
-            <a:r>
-              <a:rPr lang="en-US" sz="2800" b="1" i="1" dirty="0" smtClean="0">
-                <a:solidFill>
-                  <a:srgbClr val="7030A0"/>
-                </a:solidFill>
-              </a:rPr>
-              <a:t>3)</a:t>
-            </a:r>
-            <a:endParaRPr lang="en-US" sz="2800" b="1" i="1" dirty="0">
-              <a:solidFill>
-                <a:srgbClr val="7030A0"/>
-              </a:solidFill>
-            </a:endParaRPr>
+              <a:t>Choice of DBMS(Phase 3)</a:t>
+            </a:r>
           </a:p>
           <a:p>
             <a:pPr lvl="1">
@@ -12861,21 +12122,6 @@
   <p:clrMapOvr>
     <a:masterClrMapping/>
   </p:clrMapOvr>
-  <mc:AlternateContent xmlns:mc="http://schemas.openxmlformats.org/markup-compatibility/2006" xmlns:p14="http://schemas.microsoft.com/office/powerpoint/2010/main">
-    <mc:Choice Requires="p14">
-      <p:transition spd="slow" p14:dur="2000"/>
-    </mc:Choice>
-    <mc:Fallback xmlns="">
-      <p:transition spd="slow"/>
-    </mc:Fallback>
-  </mc:AlternateContent>
-  <p:timing>
-    <p:tnLst>
-      <p:par>
-        <p:cTn id="1" dur="indefinite" restart="never" nodeType="tmRoot"/>
-      </p:par>
-    </p:tnLst>
-  </p:timing>
 </p:sld>
 </file>
 
@@ -13008,13 +12254,6 @@
   <p:clrMapOvr>
     <a:masterClrMapping/>
   </p:clrMapOvr>
-  <p:timing>
-    <p:tnLst>
-      <p:par>
-        <p:cTn id="1" dur="indefinite" restart="never" nodeType="tmRoot"/>
-      </p:par>
-    </p:tnLst>
-  </p:timing>
 </p:sld>
 </file>
 
@@ -13113,13 +12352,6 @@
   <p:clrMapOvr>
     <a:masterClrMapping/>
   </p:clrMapOvr>
-  <p:timing>
-    <p:tnLst>
-      <p:par>
-        <p:cTn id="1" dur="indefinite" restart="never" nodeType="tmRoot"/>
-      </p:par>
-    </p:tnLst>
-  </p:timing>
 </p:sld>
 </file>
 
@@ -13238,13 +12470,6 @@
   <p:clrMapOvr>
     <a:masterClrMapping/>
   </p:clrMapOvr>
-  <p:timing>
-    <p:tnLst>
-      <p:par>
-        <p:cTn id="1" dur="indefinite" restart="never" nodeType="tmRoot"/>
-      </p:par>
-    </p:tnLst>
-  </p:timing>
 </p:sld>
 </file>
 
@@ -13289,10 +12514,6 @@
               <a:rPr lang="en-US" b="1" dirty="0"/>
               <a:t>DBMS allows users the following tasks:</a:t>
             </a:r>
-            <a:r>
-              <a:rPr lang="en-US" dirty="0"/>
-              <a:t/>
-            </a:r>
             <a:br>
               <a:rPr lang="en-US" dirty="0"/>
             </a:br>
@@ -13388,13 +12609,6 @@
   <p:clrMapOvr>
     <a:masterClrMapping/>
   </p:clrMapOvr>
-  <p:timing>
-    <p:tnLst>
-      <p:par>
-        <p:cTn id="1" dur="indefinite" restart="never" nodeType="tmRoot"/>
-      </p:par>
-    </p:tnLst>
-  </p:timing>
 </p:sld>
 </file>
 
@@ -13458,125 +12672,32 @@
             <a:pPr algn="just"/>
             <a:r>
               <a:rPr lang="en-US" sz="2800" dirty="0"/>
-              <a:t>One way to keep the information on a computer </a:t>
-            </a:r>
-            <a:r>
-              <a:rPr lang="en-US" sz="2800" dirty="0" smtClean="0"/>
-              <a:t>is to </a:t>
-            </a:r>
+              <a:t>One way to keep the information on a computer is to store it in operating system files. </a:t>
+            </a:r>
+          </a:p>
+          <a:p>
+            <a:pPr algn="just"/>
             <a:r>
               <a:rPr lang="en-US" sz="2800" dirty="0"/>
-              <a:t>store it in operating system files. </a:t>
-            </a:r>
-            <a:endParaRPr lang="en-US" sz="2800" dirty="0" smtClean="0"/>
+              <a:t>To allow users to manipulate the information, the system has a number of application programs  that manipulate the files.</a:t>
+            </a:r>
           </a:p>
           <a:p>
             <a:pPr algn="just"/>
             <a:r>
-              <a:rPr lang="en-US" sz="2800" dirty="0" smtClean="0"/>
-              <a:t>To </a:t>
-            </a:r>
-            <a:r>
-              <a:rPr lang="en-US" sz="2800" dirty="0"/>
-              <a:t>allow users to manipulate the information, the system has a number of application programs </a:t>
-            </a:r>
-            <a:r>
-              <a:rPr lang="en-US" sz="2800" dirty="0" smtClean="0"/>
-              <a:t> </a:t>
-            </a:r>
-            <a:r>
-              <a:rPr lang="en-US" sz="2800" dirty="0"/>
-              <a:t>that manipulate the </a:t>
-            </a:r>
-            <a:r>
-              <a:rPr lang="en-US" sz="2800" dirty="0" smtClean="0"/>
-              <a:t>files.</a:t>
-            </a:r>
-          </a:p>
-          <a:p>
-            <a:pPr algn="just"/>
-            <a:r>
               <a:rPr lang="en-US" sz="2800" b="1" dirty="0"/>
-              <a:t>Keeping organizational information in a file-processing system has a number of major </a:t>
-            </a:r>
-            <a:r>
-              <a:rPr lang="en-US" sz="2800" b="1" dirty="0" smtClean="0"/>
-              <a:t>disadvantages</a:t>
+              <a:t>Keeping organizational information in a file-processing system has a number of major disadvantages like  </a:t>
+            </a:r>
+            <a:r>
+              <a:rPr lang="en-US" sz="2800" b="1" dirty="0">
+                <a:solidFill>
+                  <a:srgbClr val="7030A0"/>
+                </a:solidFill>
+              </a:rPr>
+              <a:t>Data redundancy and inconsistency, Difficulty in accessing data, Atomicity problems, Security problems </a:t>
             </a:r>
             <a:r>
               <a:rPr lang="en-US" sz="2800" b="1" dirty="0"/>
-              <a:t> </a:t>
-            </a:r>
-            <a:r>
-              <a:rPr lang="en-US" sz="2800" b="1" dirty="0" smtClean="0"/>
-              <a:t>like  </a:t>
-            </a:r>
-            <a:r>
-              <a:rPr lang="en-US" sz="2800" b="1" dirty="0">
-                <a:solidFill>
-                  <a:srgbClr val="7030A0"/>
-                </a:solidFill>
-              </a:rPr>
-              <a:t>Data redundancy and </a:t>
-            </a:r>
-            <a:r>
-              <a:rPr lang="en-US" sz="2800" b="1" dirty="0" smtClean="0">
-                <a:solidFill>
-                  <a:srgbClr val="7030A0"/>
-                </a:solidFill>
-              </a:rPr>
-              <a:t>inconsistency,</a:t>
-            </a:r>
-            <a:r>
-              <a:rPr lang="en-US" sz="2800" b="1" dirty="0">
-                <a:solidFill>
-                  <a:srgbClr val="7030A0"/>
-                </a:solidFill>
-              </a:rPr>
-              <a:t> Difficulty in accessing </a:t>
-            </a:r>
-            <a:r>
-              <a:rPr lang="en-US" sz="2800" b="1" dirty="0" smtClean="0">
-                <a:solidFill>
-                  <a:srgbClr val="7030A0"/>
-                </a:solidFill>
-              </a:rPr>
-              <a:t>data,</a:t>
-            </a:r>
-            <a:r>
-              <a:rPr lang="en-US" sz="2800" b="1" dirty="0">
-                <a:solidFill>
-                  <a:srgbClr val="7030A0"/>
-                </a:solidFill>
-              </a:rPr>
-              <a:t> Atomicity </a:t>
-            </a:r>
-            <a:r>
-              <a:rPr lang="en-US" sz="2800" b="1" dirty="0" smtClean="0">
-                <a:solidFill>
-                  <a:srgbClr val="7030A0"/>
-                </a:solidFill>
-              </a:rPr>
-              <a:t>problems,</a:t>
-            </a:r>
-            <a:r>
-              <a:rPr lang="en-US" sz="2800" b="1" dirty="0">
-                <a:solidFill>
-                  <a:srgbClr val="7030A0"/>
-                </a:solidFill>
-              </a:rPr>
-              <a:t> Security </a:t>
-            </a:r>
-            <a:r>
-              <a:rPr lang="en-US" sz="2800" b="1" dirty="0" smtClean="0">
-                <a:solidFill>
-                  <a:srgbClr val="7030A0"/>
-                </a:solidFill>
-              </a:rPr>
-              <a:t>problems </a:t>
-            </a:r>
-            <a:r>
-              <a:rPr lang="en-US" sz="2800" b="1" dirty="0" smtClean="0"/>
               <a:t>etc</a:t>
             </a:r>
             <a:endParaRPr lang="en-US" sz="2800" dirty="0"/>
@@ -13597,13 +12718,6 @@
   <p:clrMapOvr>
     <a:masterClrMapping/>
   </p:clrMapOvr>
-  <p:timing>
-    <p:tnLst>
-      <p:par>
-        <p:cTn id="1" dur="indefinite" restart="never" nodeType="tmRoot"/>
-      </p:par>
-    </p:tnLst>
-  </p:timing>
 </p:sld>
 </file>
 
@@ -13704,7 +12818,6 @@
               <a:rPr lang="en-US" sz="2400" dirty="0"/>
               <a:t>. Users can get easy access to data and can also specify the type of data they want to extract. </a:t>
             </a:r>
-            <a:endParaRPr lang="en-US" sz="2400" dirty="0" smtClean="0"/>
           </a:p>
           <a:p>
             <a:r>
@@ -13744,13 +12857,6 @@
   <p:clrMapOvr>
     <a:masterClrMapping/>
   </p:clrMapOvr>
-  <p:timing>
-    <p:tnLst>
-      <p:par>
-        <p:cTn id="1" dur="indefinite" restart="never" nodeType="tmRoot"/>
-      </p:par>
-    </p:tnLst>
-  </p:timing>
 </p:sld>
 </file>
 
@@ -13854,16 +12960,8 @@
               <a:buNone/>
             </a:pPr>
             <a:r>
-              <a:rPr lang="en-US" sz="2800" b="1" i="1" dirty="0" smtClean="0"/>
-              <a:t>4</a:t>
-            </a:r>
-            <a:r>
               <a:rPr lang="en-US" sz="2800" b="1" i="1" dirty="0"/>
-              <a:t>.    Avoiding duplicates and </a:t>
-            </a:r>
-            <a:r>
-              <a:rPr lang="en-US" sz="2800" b="1" i="1" dirty="0" smtClean="0"/>
-              <a:t>Redundancy</a:t>
+              <a:t>4.    Avoiding duplicates and Redundancy</a:t>
             </a:r>
           </a:p>
           <a:p>
@@ -13880,11 +12978,7 @@
             </a:r>
             <a:r>
               <a:rPr lang="en-US" sz="2800" dirty="0"/>
-              <a:t>is used in DBMS to avoid duplicate data</a:t>
-            </a:r>
-            <a:r>
-              <a:rPr lang="en-US" sz="2800" dirty="0" smtClean="0"/>
-              <a:t>.</a:t>
+              <a:t>is used in DBMS to avoid duplicate data.</a:t>
             </a:r>
           </a:p>
           <a:p>
@@ -13911,28 +13005,15 @@
                   <a:srgbClr val="FF0000"/>
                 </a:solidFill>
               </a:rPr>
-              <a:t>. DBMS uses the ACID </a:t>
-            </a:r>
-            <a:r>
-              <a:rPr lang="en-US" sz="2800" dirty="0" smtClean="0">
-                <a:solidFill>
-                  <a:srgbClr val="FF0000"/>
-                </a:solidFill>
-              </a:rPr>
-              <a:t>approach to tackle the issue.</a:t>
-            </a:r>
-            <a:endParaRPr lang="en-US" sz="2800" dirty="0">
-              <a:solidFill>
-                <a:srgbClr val="FF0000"/>
-              </a:solidFill>
-            </a:endParaRPr>
+              <a:t>. DBMS uses the ACID approach to tackle the issue.</a:t>
+            </a:r>
           </a:p>
           <a:p>
             <a:pPr marL="114300" indent="0">
               <a:buNone/>
             </a:pPr>
             <a:r>
-              <a:rPr lang="en-US" sz="2400" dirty="0" smtClean="0"/>
+              <a:rPr lang="en-US" sz="2400" dirty="0"/>
               <a:t> </a:t>
             </a:r>
             <a:endParaRPr lang="en-US" sz="2400" b="1" dirty="0"/>
@@ -13949,13 +13030,6 @@
   <p:clrMapOvr>
     <a:masterClrMapping/>
   </p:clrMapOvr>
-  <p:timing>
-    <p:tnLst>
-      <p:par>
-        <p:cTn id="1" dur="indefinite" restart="never" nodeType="tmRoot"/>
-      </p:par>
-    </p:tnLst>
-  </p:timing>
 </p:sld>
 </file>
 
@@ -14048,13 +13122,6 @@
   <p:clrMapOvr>
     <a:masterClrMapping/>
   </p:clrMapOvr>
-  <p:timing>
-    <p:tnLst>
-      <p:par>
-        <p:cTn id="1" dur="indefinite" restart="never" nodeType="tmRoot"/>
-      </p:par>
-    </p:tnLst>
-  </p:timing>
 </p:sld>
 </file>
 
@@ -14130,15 +13197,7 @@
             </a:r>
             <a:r>
               <a:rPr lang="en-US" sz="2400" dirty="0"/>
-              <a:t> It can control </a:t>
-            </a:r>
-            <a:r>
-              <a:rPr lang="en-US" sz="2400" dirty="0" smtClean="0"/>
-              <a:t>data redundancy</a:t>
-            </a:r>
-            <a:r>
-              <a:rPr lang="en-US" sz="2400" dirty="0"/>
-              <a:t> because it stores all the data in one single database file and that recorded data is placed in the database.</a:t>
+              <a:t> It can control data redundancy because it stores all the data in one single database file and that recorded data is placed in the database.</a:t>
             </a:r>
           </a:p>
           <a:p>
@@ -14193,13 +13252,8 @@
             </a:r>
             <a:r>
               <a:rPr lang="en-US" sz="2400" dirty="0"/>
-              <a:t> It provides different types of user interfaces like graphical user interfaces, application program </a:t>
-            </a:r>
-            <a:r>
-              <a:rPr lang="en-US" sz="2400" dirty="0" smtClean="0"/>
-              <a:t>interfaces etc</a:t>
-            </a:r>
-            <a:endParaRPr lang="en-US" sz="2400" dirty="0"/>
+              <a:t> It provides different types of user interfaces like graphical user interfaces, application program interfaces etc</a:t>
+            </a:r>
           </a:p>
           <a:p>
             <a:endParaRPr lang="en-US" dirty="0"/>
@@ -14216,13 +13270,6 @@
   <p:clrMapOvr>
     <a:masterClrMapping/>
   </p:clrMapOvr>
-  <p:timing>
-    <p:tnLst>
-      <p:par>
-        <p:cTn id="1" dur="indefinite" restart="never" nodeType="tmRoot"/>
-      </p:par>
-    </p:tnLst>
-  </p:timing>
 </p:sld>
 </file>
 

</xml_diff>